<commit_message>
deleting inapproriate etl slide
</commit_message>
<xml_diff>
--- a/ch5-rel-bayes-net-classifier.pptx
+++ b/ch5-rel-bayes-net-classifier.pptx
@@ -5,10 +5,10 @@
     <p:sldMasterId id="2147483660" r:id="rId1"/>
   </p:sldMasterIdLst>
   <p:notesMasterIdLst>
-    <p:notesMasterId r:id="rId49"/>
+    <p:notesMasterId r:id="rId48"/>
   </p:notesMasterIdLst>
   <p:handoutMasterIdLst>
-    <p:handoutMasterId r:id="rId50"/>
+    <p:handoutMasterId r:id="rId49"/>
   </p:handoutMasterIdLst>
   <p:sldIdLst>
     <p:sldId id="256" r:id="rId2"/>
@@ -48,16 +48,15 @@
     <p:sldId id="278" r:id="rId36"/>
     <p:sldId id="317" r:id="rId37"/>
     <p:sldId id="350" r:id="rId38"/>
-    <p:sldId id="325" r:id="rId39"/>
-    <p:sldId id="318" r:id="rId40"/>
-    <p:sldId id="320" r:id="rId41"/>
-    <p:sldId id="319" r:id="rId42"/>
-    <p:sldId id="264" r:id="rId43"/>
-    <p:sldId id="262" r:id="rId44"/>
-    <p:sldId id="263" r:id="rId45"/>
-    <p:sldId id="266" r:id="rId46"/>
-    <p:sldId id="267" r:id="rId47"/>
-    <p:sldId id="280" r:id="rId48"/>
+    <p:sldId id="318" r:id="rId39"/>
+    <p:sldId id="320" r:id="rId40"/>
+    <p:sldId id="319" r:id="rId41"/>
+    <p:sldId id="264" r:id="rId42"/>
+    <p:sldId id="262" r:id="rId43"/>
+    <p:sldId id="263" r:id="rId44"/>
+    <p:sldId id="266" r:id="rId45"/>
+    <p:sldId id="267" r:id="rId46"/>
+    <p:sldId id="280" r:id="rId47"/>
   </p:sldIdLst>
   <p:sldSz cx="9144000" cy="6858000" type="screen4x3"/>
   <p:notesSz cx="6858000" cy="9144000"/>
@@ -248,7 +247,6 @@
         <p14:section name="Feature Extraction" id="{7B44A060-4CE3-C740-B6DE-D563E98D9754}">
           <p14:sldIdLst>
             <p14:sldId id="350"/>
-            <p14:sldId id="325"/>
             <p14:sldId id="318"/>
             <p14:sldId id="320"/>
             <p14:sldId id="319"/>
@@ -265,20 +263,6 @@
           </p14:sldIdLst>
         </p14:section>
       </p14:sectionLst>
-    </p:ext>
-    <p:ext uri="{EFAFB233-063F-42B5-8137-9DF3F51BA10A}">
-      <p15:sldGuideLst xmlns:p15="http://schemas.microsoft.com/office/powerpoint/2012/main">
-        <p15:guide id="1" orient="horz" pos="2160">
-          <p15:clr>
-            <a:srgbClr val="A4A3A4"/>
-          </p15:clr>
-        </p15:guide>
-        <p15:guide id="2" pos="2880">
-          <p15:clr>
-            <a:srgbClr val="A4A3A4"/>
-          </p15:clr>
-        </p15:guide>
-      </p15:sldGuideLst>
     </p:ext>
   </p:extLst>
 </p:presentation>
@@ -504,21 +488,20 @@
           <c:showBubbleSize val="0"/>
         </c:dLbls>
         <c:gapWidth val="150"/>
-        <c:axId val="-784422592"/>
-        <c:axId val="-784420816"/>
+        <c:axId val="2079652600"/>
+        <c:axId val="2079642360"/>
       </c:barChart>
       <c:catAx>
-        <c:axId val="-784422592"/>
+        <c:axId val="2079652600"/>
         <c:scaling>
           <c:orientation val="minMax"/>
         </c:scaling>
         <c:delete val="1"/>
         <c:axPos val="b"/>
-        <c:numFmt formatCode="General" sourceLinked="0"/>
         <c:majorTickMark val="out"/>
         <c:minorTickMark val="none"/>
         <c:tickLblPos val="nextTo"/>
-        <c:crossAx val="-784420816"/>
+        <c:crossAx val="2079642360"/>
         <c:crosses val="autoZero"/>
         <c:auto val="1"/>
         <c:lblAlgn val="ctr"/>
@@ -526,7 +509,7 @@
         <c:noMultiLvlLbl val="0"/>
       </c:catAx>
       <c:valAx>
-        <c:axId val="-784420816"/>
+        <c:axId val="2079642360"/>
         <c:scaling>
           <c:orientation val="minMax"/>
         </c:scaling>
@@ -549,13 +532,14 @@
               </a:p>
             </c:rich>
           </c:tx>
+          <c:layout/>
           <c:overlay val="0"/>
         </c:title>
         <c:numFmt formatCode="0.00" sourceLinked="1"/>
         <c:majorTickMark val="out"/>
         <c:minorTickMark val="none"/>
         <c:tickLblPos val="nextTo"/>
-        <c:crossAx val="-784422592"/>
+        <c:crossAx val="2079652600"/>
         <c:crosses val="autoZero"/>
         <c:crossBetween val="between"/>
       </c:valAx>
@@ -790,17 +774,16 @@
           <c:showBubbleSize val="0"/>
         </c:dLbls>
         <c:gapWidth val="150"/>
-        <c:axId val="-867408448"/>
-        <c:axId val="-784490272"/>
+        <c:axId val="2079547656"/>
+        <c:axId val="2079544936"/>
       </c:barChart>
       <c:catAx>
-        <c:axId val="-867408448"/>
+        <c:axId val="2079547656"/>
         <c:scaling>
           <c:orientation val="minMax"/>
         </c:scaling>
         <c:delete val="0"/>
         <c:axPos val="b"/>
-        <c:numFmt formatCode="General" sourceLinked="0"/>
         <c:majorTickMark val="out"/>
         <c:minorTickMark val="none"/>
         <c:tickLblPos val="nextTo"/>
@@ -814,7 +797,7 @@
             <a:endParaRPr lang="en-US"/>
           </a:p>
         </c:txPr>
-        <c:crossAx val="-784490272"/>
+        <c:crossAx val="2079544936"/>
         <c:crosses val="autoZero"/>
         <c:auto val="1"/>
         <c:lblAlgn val="ctr"/>
@@ -822,7 +805,7 @@
         <c:noMultiLvlLbl val="0"/>
       </c:catAx>
       <c:valAx>
-        <c:axId val="-784490272"/>
+        <c:axId val="2079544936"/>
         <c:scaling>
           <c:orientation val="minMax"/>
         </c:scaling>
@@ -846,19 +829,21 @@
               </a:p>
             </c:rich>
           </c:tx>
+          <c:layout/>
           <c:overlay val="0"/>
         </c:title>
         <c:numFmt formatCode="0.00" sourceLinked="1"/>
         <c:majorTickMark val="out"/>
         <c:minorTickMark val="none"/>
         <c:tickLblPos val="nextTo"/>
-        <c:crossAx val="-867408448"/>
+        <c:crossAx val="2079547656"/>
         <c:crosses val="autoZero"/>
         <c:crossBetween val="between"/>
       </c:valAx>
     </c:plotArea>
     <c:legend>
       <c:legendPos val="t"/>
+      <c:layout/>
       <c:overlay val="0"/>
       <c:txPr>
         <a:bodyPr/>
@@ -988,7 +973,7 @@
               <a:pPr>
                 <a:defRPr/>
               </a:pPr>
-              <a:t>6/27/17</a:t>
+              <a:t>17-07-26</a:t>
             </a:fld>
             <a:endParaRPr lang="en-US"/>
           </a:p>
@@ -1204,7 +1189,7 @@
               <a:pPr>
                 <a:defRPr/>
               </a:pPr>
-              <a:t>6/27/17</a:t>
+              <a:t>17-07-26</a:t>
             </a:fld>
             <a:endParaRPr lang="en-US"/>
           </a:p>
@@ -1572,15 +1557,15 @@
             <a:tailEnd/>
           </a:ln>
           <a:extLst>
-            <a:ext uri="{FAA26D3D-D897-4be2-8F04-BA451C77F1D7}">
-              <ma14:placeholderFlag xmlns:ma14="http://schemas.microsoft.com/office/mac/drawingml/2011/main" val="1"/>
-            </a:ext>
             <a:ext uri="{909E8E84-426E-40dd-AFC4-6F175D3DCCD1}">
-              <a14:hiddenFill xmlns:a14="http://schemas.microsoft.com/office/drawing/2010/main" xmlns="">
+              <a14:hiddenFill xmlns:a14="http://schemas.microsoft.com/office/drawing/2010/main">
                 <a:solidFill>
                   <a:srgbClr val="FFFFFF"/>
                 </a:solidFill>
               </a14:hiddenFill>
+            </a:ext>
+            <a:ext uri="{FAA26D3D-D897-4be2-8F04-BA451C77F1D7}">
+              <ma14:placeholderFlag xmlns:ma14="http://schemas.microsoft.com/office/mac/drawingml/2011/main" val="1"/>
             </a:ext>
           </a:extLst>
         </p:spPr>
@@ -1599,14 +1584,14 @@
           <a:noFill/>
           <a:extLst>
             <a:ext uri="{909E8E84-426E-40dd-AFC4-6F175D3DCCD1}">
-              <a14:hiddenFill xmlns:a14="http://schemas.microsoft.com/office/drawing/2010/main" xmlns="">
+              <a14:hiddenFill xmlns:a14="http://schemas.microsoft.com/office/drawing/2010/main">
                 <a:solidFill>
                   <a:srgbClr val="FFFFFF"/>
                 </a:solidFill>
               </a14:hiddenFill>
             </a:ext>
             <a:ext uri="{91240B29-F687-4f45-9708-019B960494DF}">
-              <a14:hiddenLine xmlns:a14="http://schemas.microsoft.com/office/drawing/2010/main" xmlns="" w="9525">
+              <a14:hiddenLine xmlns:a14="http://schemas.microsoft.com/office/drawing/2010/main" w="9525">
                 <a:solidFill>
                   <a:srgbClr val="000000"/>
                 </a:solidFill>
@@ -1646,14 +1631,14 @@
           <a:noFill/>
           <a:extLst>
             <a:ext uri="{909E8E84-426E-40dd-AFC4-6F175D3DCCD1}">
-              <a14:hiddenFill xmlns:a14="http://schemas.microsoft.com/office/drawing/2010/main" xmlns="">
+              <a14:hiddenFill xmlns:a14="http://schemas.microsoft.com/office/drawing/2010/main">
                 <a:solidFill>
                   <a:srgbClr val="FFFFFF"/>
                 </a:solidFill>
               </a14:hiddenFill>
             </a:ext>
             <a:ext uri="{91240B29-F687-4f45-9708-019B960494DF}">
-              <a14:hiddenLine xmlns:a14="http://schemas.microsoft.com/office/drawing/2010/main" xmlns="" w="9525">
+              <a14:hiddenLine xmlns:a14="http://schemas.microsoft.com/office/drawing/2010/main" w="9525">
                 <a:solidFill>
                   <a:srgbClr val="000000"/>
                 </a:solidFill>
@@ -3893,7 +3878,7 @@
               <a:pPr>
                 <a:defRPr/>
               </a:pPr>
-              <a:t>39</a:t>
+              <a:t>38</a:t>
             </a:fld>
             <a:endParaRPr lang="en-US"/>
           </a:p>
@@ -4055,7 +4040,7 @@
               <a:pPr>
                 <a:defRPr/>
               </a:pPr>
-              <a:t>40</a:t>
+              <a:t>39</a:t>
             </a:fld>
             <a:endParaRPr lang="en-US"/>
           </a:p>
@@ -4126,6 +4111,32 @@
               <a:rPr lang="en-US" dirty="0" err="1" smtClean="0"/>
               <a:t>Lavrac</a:t>
             </a:r>
+            <a:endParaRPr lang="en-US" dirty="0" smtClean="0"/>
+          </a:p>
+          <a:p>
+            <a:pPr marL="0" marR="0" lvl="1" indent="0" algn="l" defTabSz="457200" rtl="0" eaLnBrk="0" fontAlgn="base" latinLnBrk="0" hangingPunct="0">
+              <a:lnSpc>
+                <a:spcPct val="100000"/>
+              </a:lnSpc>
+              <a:spcBef>
+                <a:spcPct val="30000"/>
+              </a:spcBef>
+              <a:spcAft>
+                <a:spcPct val="0"/>
+              </a:spcAft>
+              <a:buClrTx/>
+              <a:buSzTx/>
+              <a:buFontTx/>
+              <a:buNone/>
+              <a:tabLst/>
+              <a:defRPr/>
+            </a:pPr>
+            <a:r>
+              <a:rPr lang="en-US" smtClean="0"/>
+              <a:t>Another term could be relation elimination</a:t>
+            </a:r>
+          </a:p>
+          <a:p>
             <a:endParaRPr lang="en-US" dirty="0"/>
           </a:p>
         </p:txBody>
@@ -4153,7 +4164,7 @@
               <a:pPr>
                 <a:defRPr/>
               </a:pPr>
-              <a:t>41</a:t>
+              <a:t>40</a:t>
             </a:fld>
             <a:endParaRPr lang="en-US"/>
           </a:p>
@@ -4274,7 +4285,7 @@
               <a:pPr>
                 <a:defRPr/>
               </a:pPr>
-              <a:t>44</a:t>
+              <a:t>43</a:t>
             </a:fld>
             <a:endParaRPr lang="en-US"/>
           </a:p>
@@ -4759,7 +4770,7 @@
               <a:pPr>
                 <a:defRPr/>
               </a:pPr>
-              <a:t>45</a:t>
+              <a:t>44</a:t>
             </a:fld>
             <a:endParaRPr lang="en-US"/>
           </a:p>
@@ -4855,7 +4866,7 @@
               <a:pPr>
                 <a:defRPr/>
               </a:pPr>
-              <a:t>46</a:t>
+              <a:t>45</a:t>
             </a:fld>
             <a:endParaRPr lang="en-US"/>
           </a:p>
@@ -5909,7 +5920,7 @@
               <a:pPr>
                 <a:defRPr/>
               </a:pPr>
-              <a:t>6/27/17</a:t>
+              <a:t>17-07-26</a:t>
             </a:fld>
             <a:endParaRPr lang="en-US"/>
           </a:p>
@@ -6110,7 +6121,7 @@
               <a:pPr>
                 <a:defRPr/>
               </a:pPr>
-              <a:t>6/27/17</a:t>
+              <a:t>17-07-26</a:t>
             </a:fld>
             <a:endParaRPr lang="en-US"/>
           </a:p>
@@ -6321,7 +6332,7 @@
               <a:pPr>
                 <a:defRPr/>
               </a:pPr>
-              <a:t>6/27/17</a:t>
+              <a:t>17-07-26</a:t>
             </a:fld>
             <a:endParaRPr lang="en-US"/>
           </a:p>
@@ -6527,7 +6538,7 @@
               <a:pPr>
                 <a:defRPr/>
               </a:pPr>
-              <a:t>6/27/17</a:t>
+              <a:t>17-07-26</a:t>
             </a:fld>
             <a:endParaRPr lang="en-US"/>
           </a:p>
@@ -7046,7 +7057,7 @@
               <a:pPr>
                 <a:defRPr/>
               </a:pPr>
-              <a:t>6/27/17</a:t>
+              <a:t>17-07-26</a:t>
             </a:fld>
             <a:endParaRPr lang="en-US"/>
           </a:p>
@@ -7319,7 +7330,7 @@
               <a:pPr>
                 <a:defRPr/>
               </a:pPr>
-              <a:t>6/27/17</a:t>
+              <a:t>17-07-26</a:t>
             </a:fld>
             <a:endParaRPr lang="en-US"/>
           </a:p>
@@ -7717,7 +7728,7 @@
               <a:pPr>
                 <a:defRPr/>
               </a:pPr>
-              <a:t>6/27/17</a:t>
+              <a:t>17-07-26</a:t>
             </a:fld>
             <a:endParaRPr lang="en-US"/>
           </a:p>
@@ -7866,7 +7877,7 @@
               <a:pPr>
                 <a:defRPr/>
               </a:pPr>
-              <a:t>6/27/17</a:t>
+              <a:t>17-07-26</a:t>
             </a:fld>
             <a:endParaRPr lang="en-US"/>
           </a:p>
@@ -7992,7 +8003,7 @@
               <a:pPr>
                 <a:defRPr/>
               </a:pPr>
-              <a:t>6/27/17</a:t>
+              <a:t>17-07-26</a:t>
             </a:fld>
             <a:endParaRPr lang="en-US"/>
           </a:p>
@@ -8368,7 +8379,7 @@
               <a:pPr>
                 <a:defRPr/>
               </a:pPr>
-              <a:t>6/27/17</a:t>
+              <a:t>17-07-26</a:t>
             </a:fld>
             <a:endParaRPr lang="en-US"/>
           </a:p>
@@ -8791,7 +8802,7 @@
               <a:pPr>
                 <a:defRPr/>
               </a:pPr>
-              <a:t>6/27/17</a:t>
+              <a:t>17-07-26</a:t>
             </a:fld>
             <a:endParaRPr lang="en-US"/>
           </a:p>
@@ -9038,18 +9049,15 @@
             <a:noFill/>
           </a:ln>
           <a:extLst>
-            <a:ext uri="{FAA26D3D-D897-4be2-8F04-BA451C77F1D7}">
-              <ma14:placeholderFlag xmlns:ma14="http://schemas.microsoft.com/office/mac/drawingml/2011/main" val="1"/>
-            </a:ext>
             <a:ext uri="{909E8E84-426E-40dd-AFC4-6F175D3DCCD1}">
-              <a14:hiddenFill xmlns:a14="http://schemas.microsoft.com/office/drawing/2010/main" xmlns="">
+              <a14:hiddenFill xmlns:a14="http://schemas.microsoft.com/office/drawing/2010/main">
                 <a:solidFill>
                   <a:srgbClr val="FFFFFF"/>
                 </a:solidFill>
               </a14:hiddenFill>
             </a:ext>
             <a:ext uri="{91240B29-F687-4f45-9708-019B960494DF}">
-              <a14:hiddenLine xmlns:a14="http://schemas.microsoft.com/office/drawing/2010/main" xmlns="" w="9525">
+              <a14:hiddenLine xmlns:a14="http://schemas.microsoft.com/office/drawing/2010/main" w="9525">
                 <a:solidFill>
                   <a:srgbClr val="000000"/>
                 </a:solidFill>
@@ -9057,6 +9065,9 @@
                 <a:headEnd/>
                 <a:tailEnd/>
               </a14:hiddenLine>
+            </a:ext>
+            <a:ext uri="{FAA26D3D-D897-4be2-8F04-BA451C77F1D7}">
+              <ma14:placeholderFlag xmlns:ma14="http://schemas.microsoft.com/office/mac/drawingml/2011/main" val="1"/>
             </a:ext>
           </a:extLst>
         </p:spPr>
@@ -9100,18 +9111,15 @@
             <a:noFill/>
           </a:ln>
           <a:extLst>
-            <a:ext uri="{FAA26D3D-D897-4be2-8F04-BA451C77F1D7}">
-              <ma14:placeholderFlag xmlns:ma14="http://schemas.microsoft.com/office/mac/drawingml/2011/main" val="1"/>
-            </a:ext>
             <a:ext uri="{909E8E84-426E-40dd-AFC4-6F175D3DCCD1}">
-              <a14:hiddenFill xmlns:a14="http://schemas.microsoft.com/office/drawing/2010/main" xmlns="">
+              <a14:hiddenFill xmlns:a14="http://schemas.microsoft.com/office/drawing/2010/main">
                 <a:solidFill>
                   <a:srgbClr val="FFFFFF"/>
                 </a:solidFill>
               </a14:hiddenFill>
             </a:ext>
             <a:ext uri="{91240B29-F687-4f45-9708-019B960494DF}">
-              <a14:hiddenLine xmlns:a14="http://schemas.microsoft.com/office/drawing/2010/main" xmlns="" w="9525">
+              <a14:hiddenLine xmlns:a14="http://schemas.microsoft.com/office/drawing/2010/main" w="9525">
                 <a:solidFill>
                   <a:srgbClr val="000000"/>
                 </a:solidFill>
@@ -9119,6 +9127,9 @@
                 <a:headEnd/>
                 <a:tailEnd/>
               </a14:hiddenLine>
+            </a:ext>
+            <a:ext uri="{FAA26D3D-D897-4be2-8F04-BA451C77F1D7}">
+              <ma14:placeholderFlag xmlns:ma14="http://schemas.microsoft.com/office/mac/drawingml/2011/main" val="1"/>
             </a:ext>
           </a:extLst>
         </p:spPr>
@@ -9211,7 +9222,7 @@
               <a:pPr>
                 <a:defRPr/>
               </a:pPr>
-              <a:t>6/27/17</a:t>
+              <a:t>17-07-26</a:t>
             </a:fld>
             <a:endParaRPr lang="en-US"/>
           </a:p>
@@ -9340,14 +9351,14 @@
           </a:ln>
           <a:extLst>
             <a:ext uri="{909E8E84-426E-40dd-AFC4-6F175D3DCCD1}">
-              <a14:hiddenFill xmlns:a14="http://schemas.microsoft.com/office/drawing/2010/main" xmlns="">
+              <a14:hiddenFill xmlns:a14="http://schemas.microsoft.com/office/drawing/2010/main">
                 <a:solidFill>
                   <a:srgbClr val="FFFFFF"/>
                 </a:solidFill>
               </a14:hiddenFill>
             </a:ext>
             <a:ext uri="{91240B29-F687-4f45-9708-019B960494DF}">
-              <a14:hiddenLine xmlns:a14="http://schemas.microsoft.com/office/drawing/2010/main" xmlns="" w="9525">
+              <a14:hiddenLine xmlns:a14="http://schemas.microsoft.com/office/drawing/2010/main" w="9525">
                 <a:solidFill>
                   <a:srgbClr val="000000"/>
                 </a:solidFill>
@@ -10012,14 +10023,14 @@
           </a:ln>
           <a:extLst>
             <a:ext uri="{909E8E84-426E-40dd-AFC4-6F175D3DCCD1}">
-              <a14:hiddenFill xmlns:a14="http://schemas.microsoft.com/office/drawing/2010/main" xmlns="">
+              <a14:hiddenFill xmlns:a14="http://schemas.microsoft.com/office/drawing/2010/main">
                 <a:solidFill>
                   <a:srgbClr val="FFFFFF"/>
                 </a:solidFill>
               </a14:hiddenFill>
             </a:ext>
             <a:ext uri="{91240B29-F687-4f45-9708-019B960494DF}">
-              <a14:hiddenLine xmlns:a14="http://schemas.microsoft.com/office/drawing/2010/main" xmlns="" w="9525">
+              <a14:hiddenLine xmlns:a14="http://schemas.microsoft.com/office/drawing/2010/main" w="9525">
                 <a:solidFill>
                   <a:srgbClr val="000000"/>
                 </a:solidFill>
@@ -10135,7 +10146,7 @@
   <p:timing>
     <p:tnLst>
       <p:par>
-        <p:cTn id="1" dur="indefinite" restart="never" nodeType="tmRoot"/>
+        <p:cTn xmlns:p14="http://schemas.microsoft.com/office/powerpoint/2010/main" id="1" dur="indefinite" restart="never" nodeType="tmRoot"/>
       </p:par>
     </p:tnLst>
   </p:timing>
@@ -10244,7 +10255,7 @@
   <p:timing>
     <p:tnLst>
       <p:par>
-        <p:cTn id="1" dur="indefinite" restart="never" nodeType="tmRoot"/>
+        <p:cTn xmlns:p14="http://schemas.microsoft.com/office/powerpoint/2010/main" id="1" dur="indefinite" restart="never" nodeType="tmRoot"/>
       </p:par>
     </p:tnLst>
   </p:timing>
@@ -10532,7 +10543,7 @@
   <p:timing>
     <p:tnLst>
       <p:par>
-        <p:cTn id="1" dur="indefinite" restart="never" nodeType="tmRoot">
+        <p:cTn xmlns:p14="http://schemas.microsoft.com/office/powerpoint/2010/main" id="1" dur="indefinite" restart="never" nodeType="tmRoot">
           <p:childTnLst>
             <p:seq concurrent="1" nextAc="seek">
               <p:cTn id="2" dur="indefinite" nodeType="mainSeq">
@@ -11021,7 +11032,7 @@
   <p:timing>
     <p:tnLst>
       <p:par>
-        <p:cTn id="1" dur="indefinite" restart="never" nodeType="tmRoot"/>
+        <p:cTn xmlns:p14="http://schemas.microsoft.com/office/powerpoint/2010/main" id="1" dur="indefinite" restart="never" nodeType="tmRoot"/>
       </p:par>
     </p:tnLst>
   </p:timing>
@@ -11504,7 +11515,7 @@
   <p:timing>
     <p:tnLst>
       <p:par>
-        <p:cTn id="1" dur="indefinite" restart="never" nodeType="tmRoot"/>
+        <p:cTn xmlns:p14="http://schemas.microsoft.com/office/powerpoint/2010/main" id="1" dur="indefinite" restart="never" nodeType="tmRoot"/>
       </p:par>
     </p:tnLst>
   </p:timing>
@@ -12295,7 +12306,7 @@
   <p:timing>
     <p:tnLst>
       <p:par>
-        <p:cTn id="1" dur="indefinite" restart="never" nodeType="tmRoot"/>
+        <p:cTn xmlns:p14="http://schemas.microsoft.com/office/powerpoint/2010/main" id="1" dur="indefinite" restart="never" nodeType="tmRoot"/>
       </p:par>
     </p:tnLst>
   </p:timing>
@@ -12459,7 +12470,7 @@
   <p:timing>
     <p:tnLst>
       <p:par>
-        <p:cTn id="1" dur="indefinite" restart="never" nodeType="tmRoot"/>
+        <p:cTn xmlns:p14="http://schemas.microsoft.com/office/powerpoint/2010/main" id="1" dur="indefinite" restart="never" nodeType="tmRoot"/>
       </p:par>
     </p:tnLst>
   </p:timing>
@@ -12568,7 +12579,7 @@
   <p:timing>
     <p:tnLst>
       <p:par>
-        <p:cTn id="1" dur="indefinite" restart="never" nodeType="tmRoot"/>
+        <p:cTn xmlns:p14="http://schemas.microsoft.com/office/powerpoint/2010/main" id="1" dur="indefinite" restart="never" nodeType="tmRoot"/>
       </p:par>
     </p:tnLst>
   </p:timing>
@@ -12995,7 +13006,7 @@
   <p:timing>
     <p:tnLst>
       <p:par>
-        <p:cTn id="1" dur="indefinite" restart="never" nodeType="tmRoot"/>
+        <p:cTn xmlns:p14="http://schemas.microsoft.com/office/powerpoint/2010/main" id="1" dur="indefinite" restart="never" nodeType="tmRoot"/>
       </p:par>
     </p:tnLst>
   </p:timing>
@@ -13356,7 +13367,7 @@
   <p:timing>
     <p:tnLst>
       <p:par>
-        <p:cTn id="1" dur="indefinite" restart="never" nodeType="tmRoot"/>
+        <p:cTn xmlns:p14="http://schemas.microsoft.com/office/powerpoint/2010/main" id="1" dur="indefinite" restart="never" nodeType="tmRoot"/>
       </p:par>
     </p:tnLst>
   </p:timing>
@@ -13941,7 +13952,7 @@
   <p:timing>
     <p:tnLst>
       <p:par>
-        <p:cTn id="1" dur="indefinite" restart="never" nodeType="tmRoot"/>
+        <p:cTn xmlns:p14="http://schemas.microsoft.com/office/powerpoint/2010/main" id="1" dur="indefinite" restart="never" nodeType="tmRoot"/>
       </p:par>
     </p:tnLst>
   </p:timing>
@@ -15231,7 +15242,7 @@
   <p:timing>
     <p:tnLst>
       <p:par>
-        <p:cTn id="1" dur="indefinite" restart="never" nodeType="tmRoot"/>
+        <p:cTn xmlns:p14="http://schemas.microsoft.com/office/powerpoint/2010/main" id="1" dur="indefinite" restart="never" nodeType="tmRoot"/>
       </p:par>
     </p:tnLst>
   </p:timing>
@@ -16522,7 +16533,7 @@
   <p:timing>
     <p:tnLst>
       <p:par>
-        <p:cTn id="1" dur="indefinite" restart="never" nodeType="tmRoot"/>
+        <p:cTn xmlns:p14="http://schemas.microsoft.com/office/powerpoint/2010/main" id="1" dur="indefinite" restart="never" nodeType="tmRoot"/>
       </p:par>
     </p:tnLst>
   </p:timing>
@@ -17151,7 +17162,7 @@
   <p:timing>
     <p:tnLst>
       <p:par>
-        <p:cTn id="1" dur="indefinite" restart="never" nodeType="tmRoot"/>
+        <p:cTn xmlns:p14="http://schemas.microsoft.com/office/powerpoint/2010/main" id="1" dur="indefinite" restart="never" nodeType="tmRoot"/>
       </p:par>
     </p:tnLst>
   </p:timing>
@@ -17942,7 +17953,7 @@
   <p:timing>
     <p:tnLst>
       <p:par>
-        <p:cTn id="1" dur="indefinite" restart="never" nodeType="tmRoot"/>
+        <p:cTn xmlns:p14="http://schemas.microsoft.com/office/powerpoint/2010/main" id="1" dur="indefinite" restart="never" nodeType="tmRoot"/>
       </p:par>
     </p:tnLst>
   </p:timing>
@@ -19237,7 +19248,7 @@
   <p:timing>
     <p:tnLst>
       <p:par>
-        <p:cTn id="1" dur="indefinite" restart="never" nodeType="tmRoot"/>
+        <p:cTn xmlns:p14="http://schemas.microsoft.com/office/powerpoint/2010/main" id="1" dur="indefinite" restart="never" nodeType="tmRoot"/>
       </p:par>
     </p:tnLst>
   </p:timing>
@@ -19789,18 +19800,15 @@
             <a:noFill/>
           </a:ln>
           <a:extLst>
-            <a:ext uri="{FAA26D3D-D897-4be2-8F04-BA451C77F1D7}">
-              <ma14:placeholderFlag xmlns:ma14="http://schemas.microsoft.com/office/mac/drawingml/2011/main" val="1"/>
-            </a:ext>
             <a:ext uri="{909E8E84-426E-40dd-AFC4-6F175D3DCCD1}">
-              <a14:hiddenFill xmlns:a14="http://schemas.microsoft.com/office/drawing/2010/main" xmlns="">
+              <a14:hiddenFill xmlns:a14="http://schemas.microsoft.com/office/drawing/2010/main">
                 <a:solidFill>
                   <a:srgbClr val="FFFFFF"/>
                 </a:solidFill>
               </a14:hiddenFill>
             </a:ext>
             <a:ext uri="{91240B29-F687-4f45-9708-019B960494DF}">
-              <a14:hiddenLine xmlns:a14="http://schemas.microsoft.com/office/drawing/2010/main" xmlns="" w="9525">
+              <a14:hiddenLine xmlns:a14="http://schemas.microsoft.com/office/drawing/2010/main" w="9525">
                 <a:solidFill>
                   <a:srgbClr val="000000"/>
                 </a:solidFill>
@@ -19808,6 +19816,9 @@
                 <a:headEnd/>
                 <a:tailEnd/>
               </a14:hiddenLine>
+            </a:ext>
+            <a:ext uri="{FAA26D3D-D897-4be2-8F04-BA451C77F1D7}">
+              <ma14:placeholderFlag xmlns:ma14="http://schemas.microsoft.com/office/mac/drawingml/2011/main" val="1"/>
             </a:ext>
           </a:extLst>
         </p:spPr>
@@ -20035,7 +20046,7 @@
   <p:timing>
     <p:tnLst>
       <p:par>
-        <p:cTn id="1" dur="indefinite" restart="never" nodeType="tmRoot"/>
+        <p:cTn xmlns:p14="http://schemas.microsoft.com/office/powerpoint/2010/main" id="1" dur="indefinite" restart="never" nodeType="tmRoot"/>
       </p:par>
     </p:tnLst>
   </p:timing>
@@ -20623,7 +20634,7 @@
   <p:timing>
     <p:tnLst>
       <p:par>
-        <p:cTn id="1" dur="indefinite" restart="never" nodeType="tmRoot"/>
+        <p:cTn xmlns:p14="http://schemas.microsoft.com/office/powerpoint/2010/main" id="1" dur="indefinite" restart="never" nodeType="tmRoot"/>
       </p:par>
     </p:tnLst>
   </p:timing>
@@ -22023,7 +22034,7 @@
   <p:timing>
     <p:tnLst>
       <p:par>
-        <p:cTn id="1" dur="indefinite" restart="never" nodeType="tmRoot"/>
+        <p:cTn xmlns:p14="http://schemas.microsoft.com/office/powerpoint/2010/main" id="1" dur="indefinite" restart="never" nodeType="tmRoot"/>
       </p:par>
     </p:tnLst>
   </p:timing>
@@ -23411,7 +23422,7 @@
   <p:timing>
     <p:tnLst>
       <p:par>
-        <p:cTn id="1" dur="indefinite" restart="never" nodeType="tmRoot"/>
+        <p:cTn xmlns:p14="http://schemas.microsoft.com/office/powerpoint/2010/main" id="1" dur="indefinite" restart="never" nodeType="tmRoot"/>
       </p:par>
     </p:tnLst>
   </p:timing>
@@ -23834,7 +23845,7 @@
   <p:timing>
     <p:tnLst>
       <p:par>
-        <p:cTn id="1" dur="indefinite" restart="never" nodeType="tmRoot"/>
+        <p:cTn xmlns:p14="http://schemas.microsoft.com/office/powerpoint/2010/main" id="1" dur="indefinite" restart="never" nodeType="tmRoot"/>
       </p:par>
     </p:tnLst>
   </p:timing>
@@ -24361,7 +24372,7 @@
   <p:timing>
     <p:tnLst>
       <p:par>
-        <p:cTn id="1" dur="indefinite" restart="never" nodeType="tmRoot"/>
+        <p:cTn xmlns:p14="http://schemas.microsoft.com/office/powerpoint/2010/main" id="1" dur="indefinite" restart="never" nodeType="tmRoot"/>
       </p:par>
     </p:tnLst>
   </p:timing>
@@ -24742,7 +24753,7 @@
   <p:timing>
     <p:tnLst>
       <p:par>
-        <p:cTn id="1" dur="indefinite" restart="never" nodeType="tmRoot"/>
+        <p:cTn xmlns:p14="http://schemas.microsoft.com/office/powerpoint/2010/main" id="1" dur="indefinite" restart="never" nodeType="tmRoot"/>
       </p:par>
     </p:tnLst>
   </p:timing>
@@ -24881,7 +24892,7 @@
           <a:p>
             <a:r>
               <a:rPr lang="en-US" dirty="0" smtClean="0"/>
-              <a:t>Network Template View</a:t>
+              <a:t>Visualization</a:t>
             </a:r>
             <a:endParaRPr lang="en-US" dirty="0"/>
           </a:p>
@@ -24900,7 +24911,7 @@
         <p:spPr>
           <a:xfrm>
             <a:off x="914400" y="1447800"/>
-            <a:ext cx="4290586" cy="3505419"/>
+            <a:ext cx="7772400" cy="4306726"/>
           </a:xfrm>
         </p:spPr>
         <p:txBody>
@@ -24908,708 +24919,53 @@
           <a:lstStyle/>
           <a:p>
             <a:r>
+              <a:rPr lang="en-US" sz="2800" dirty="0" smtClean="0"/>
+              <a:t>Learned features can be visualized in a data matrix</a:t>
+            </a:r>
+          </a:p>
+          <a:p>
+            <a:pPr lvl="1"/>
+            <a:r>
+              <a:rPr lang="en-US" dirty="0" smtClean="0"/>
+              <a:t>Row = target instance</a:t>
+            </a:r>
+          </a:p>
+          <a:p>
+            <a:pPr lvl="1"/>
+            <a:r>
               <a:rPr lang="en-US" dirty="0"/>
-              <a:t>For each user, form an </a:t>
-            </a:r>
-            <a:r>
-              <a:rPr lang="en-US" i="1" dirty="0" err="1"/>
-              <a:t>egonet</a:t>
-            </a:r>
-            <a:r>
-              <a:rPr lang="en-US" dirty="0"/>
-              <a:t>, a </a:t>
-            </a:r>
-            <a:r>
-              <a:rPr lang="en-US" dirty="0" err="1"/>
-              <a:t>subgraph</a:t>
-            </a:r>
-            <a:r>
-              <a:rPr lang="en-US" dirty="0"/>
-              <a:t> with their links</a:t>
-            </a:r>
+              <a:t>Column = conjunctive </a:t>
+            </a:r>
+            <a:r>
+              <a:rPr lang="en-US" dirty="0" smtClean="0"/>
+              <a:t>feature = child-parent value assignment</a:t>
+            </a:r>
+            <a:endParaRPr lang="en-US" dirty="0"/>
           </a:p>
           <a:p>
             <a:pPr lvl="1"/>
             <a:r>
-              <a:rPr lang="en-US" dirty="0"/>
-              <a:t>e.g. Brad Pitt</a:t>
-            </a:r>
-          </a:p>
-          <a:p>
-            <a:r>
-              <a:rPr lang="en-US" dirty="0"/>
-              <a:t>Calculate each feature frequency in the </a:t>
-            </a:r>
-            <a:r>
-              <a:rPr lang="en-US" dirty="0" err="1" smtClean="0"/>
-              <a:t>egonet</a:t>
-            </a:r>
-            <a:endParaRPr lang="en-US" dirty="0"/>
-          </a:p>
-          <a:p>
-            <a:r>
-              <a:rPr lang="en-US" dirty="0"/>
-              <a:t>Previously explored with </a:t>
-            </a:r>
-            <a:r>
               <a:rPr lang="en-US" dirty="0" smtClean="0"/>
-              <a:t>hand-crafted </a:t>
-            </a:r>
-            <a:r>
-              <a:rPr lang="en-US" dirty="0"/>
-              <a:t>features (ODDBALL)</a:t>
-            </a:r>
-          </a:p>
-        </p:txBody>
-      </p:sp>
-      <p:sp>
-        <p:nvSpPr>
-          <p:cNvPr id="4" name="Footer Placeholder 3"/>
-          <p:cNvSpPr>
-            <a:spLocks noGrp="1"/>
-          </p:cNvSpPr>
-          <p:nvPr>
-            <p:ph type="ftr" sz="quarter" idx="11"/>
-          </p:nvPr>
-        </p:nvSpPr>
-        <p:spPr>
-          <a:xfrm>
-            <a:off x="376264" y="6019800"/>
-            <a:ext cx="8310535" cy="609600"/>
-          </a:xfrm>
-        </p:spPr>
-        <p:txBody>
-          <a:bodyPr/>
-          <a:lstStyle/>
-          <a:p>
-            <a:r>
-              <a:rPr lang="en-US"/>
-              <a:t>Akoglu, L.; Mcglohon, M. &amp; Faloutsos, C. (2010), OddBall: Spotting Anomalies in Weighted Graphs, </a:t>
-            </a:r>
-            <a:r>
-              <a:rPr lang="en-US" i="1"/>
-              <a:t>in 'PAKDD', pp. 410-421.</a:t>
-            </a:r>
-          </a:p>
-          <a:p>
-            <a:endParaRPr lang="en-US"/>
-          </a:p>
-        </p:txBody>
-      </p:sp>
-      <p:cxnSp>
-        <p:nvCxnSpPr>
-          <p:cNvPr id="11" name="Straight Arrow Connector 10"/>
-          <p:cNvCxnSpPr>
-            <a:stCxn id="8" idx="0"/>
-            <a:endCxn id="10" idx="2"/>
-          </p:cNvCxnSpPr>
-          <p:nvPr/>
-        </p:nvCxnSpPr>
-        <p:spPr>
-          <a:xfrm flipV="1">
-            <a:off x="11114017" y="3929508"/>
-            <a:ext cx="42480" cy="101154"/>
-          </a:xfrm>
-          <a:prstGeom prst="straightConnector1">
-            <a:avLst/>
-          </a:prstGeom>
-          <a:ln>
-            <a:tailEnd type="arrow"/>
-          </a:ln>
-        </p:spPr>
-        <p:style>
-          <a:lnRef idx="2">
-            <a:schemeClr val="accent1"/>
-          </a:lnRef>
-          <a:fillRef idx="0">
-            <a:schemeClr val="accent1"/>
-          </a:fillRef>
-          <a:effectRef idx="1">
-            <a:schemeClr val="accent1"/>
-          </a:effectRef>
-          <a:fontRef idx="minor">
-            <a:schemeClr val="tx1"/>
-          </a:fontRef>
-        </p:style>
-      </p:cxnSp>
-      <p:cxnSp>
-        <p:nvCxnSpPr>
-          <p:cNvPr id="12" name="Straight Arrow Connector 11"/>
-          <p:cNvCxnSpPr>
-            <a:stCxn id="9" idx="0"/>
-          </p:cNvCxnSpPr>
-          <p:nvPr/>
-        </p:nvCxnSpPr>
-        <p:spPr>
-          <a:xfrm flipH="1" flipV="1">
-            <a:off x="11813942" y="3853458"/>
-            <a:ext cx="33512" cy="224102"/>
-          </a:xfrm>
-          <a:prstGeom prst="straightConnector1">
-            <a:avLst/>
-          </a:prstGeom>
-          <a:ln>
-            <a:tailEnd type="arrow"/>
-          </a:ln>
-        </p:spPr>
-        <p:style>
-          <a:lnRef idx="2">
-            <a:schemeClr val="accent1"/>
-          </a:lnRef>
-          <a:fillRef idx="0">
-            <a:schemeClr val="accent1"/>
-          </a:fillRef>
-          <a:effectRef idx="1">
-            <a:schemeClr val="accent1"/>
-          </a:effectRef>
-          <a:fontRef idx="minor">
-            <a:schemeClr val="tx1"/>
-          </a:fontRef>
-        </p:style>
-      </p:cxnSp>
-      <p:grpSp>
-        <p:nvGrpSpPr>
-          <p:cNvPr id="28" name="Group 27"/>
-          <p:cNvGrpSpPr/>
-          <p:nvPr/>
-        </p:nvGrpSpPr>
-        <p:grpSpPr>
-          <a:xfrm>
-            <a:off x="6005439" y="709752"/>
-            <a:ext cx="1951287" cy="5252096"/>
-            <a:chOff x="6453716" y="709752"/>
-            <a:chExt cx="1951287" cy="5252096"/>
-          </a:xfrm>
-        </p:grpSpPr>
-        <p:pic>
-          <p:nvPicPr>
-            <p:cNvPr id="16" name="Picture 15" descr="pitt.jpeg"/>
-            <p:cNvPicPr>
-              <a:picLocks noChangeAspect="1"/>
-            </p:cNvPicPr>
-            <p:nvPr/>
-          </p:nvPicPr>
-          <p:blipFill>
-            <a:blip r:embed="rId2">
-              <a:extLst>
-                <a:ext uri="{28A0092B-C50C-407E-A947-70E740481C1C}">
-                  <a14:useLocalDpi xmlns:a14="http://schemas.microsoft.com/office/drawing/2010/main" val="0"/>
-                </a:ext>
-              </a:extLst>
-            </a:blip>
-            <a:stretch>
-              <a:fillRect/>
-            </a:stretch>
-          </p:blipFill>
-          <p:spPr>
-            <a:xfrm>
-              <a:off x="7023319" y="1417638"/>
-              <a:ext cx="850900" cy="1244600"/>
-            </a:xfrm>
-            <a:prstGeom prst="rect">
-              <a:avLst/>
-            </a:prstGeom>
-          </p:spPr>
-        </p:pic>
-        <p:sp>
-          <p:nvSpPr>
-            <p:cNvPr id="17" name="TextBox 16"/>
-            <p:cNvSpPr txBox="1"/>
-            <p:nvPr/>
-          </p:nvSpPr>
-          <p:spPr>
-            <a:xfrm>
-              <a:off x="6657259" y="3031756"/>
-              <a:ext cx="791883" cy="707886"/>
-            </a:xfrm>
-            <a:prstGeom prst="rect">
-              <a:avLst/>
-            </a:prstGeom>
-            <a:noFill/>
-          </p:spPr>
-          <p:txBody>
-            <a:bodyPr wrap="square" rtlCol="0">
-              <a:spAutoFit/>
-            </a:bodyPr>
-            <a:lstStyle/>
-            <a:p>
-              <a:r>
-                <a:rPr lang="en-US" sz="2000" dirty="0" smtClean="0">
-                  <a:solidFill>
-                    <a:srgbClr val="FF0000"/>
-                  </a:solidFill>
-                  <a:latin typeface="+mn-lt"/>
-                </a:rPr>
-                <a:t>False</a:t>
-              </a:r>
-            </a:p>
-            <a:p>
-              <a:r>
-                <a:rPr lang="en-US" sz="2000" dirty="0" smtClean="0">
-                  <a:solidFill>
-                    <a:srgbClr val="FF0000"/>
-                  </a:solidFill>
-                  <a:latin typeface="+mn-lt"/>
-                </a:rPr>
-                <a:t>n/a	</a:t>
-              </a:r>
-              <a:endParaRPr lang="en-US" sz="2000" dirty="0">
-                <a:solidFill>
-                  <a:srgbClr val="FF0000"/>
-                </a:solidFill>
-                <a:latin typeface="+mn-lt"/>
-              </a:endParaRPr>
-            </a:p>
-          </p:txBody>
-        </p:sp>
-        <p:cxnSp>
-          <p:nvCxnSpPr>
-            <p:cNvPr id="18" name="Straight Arrow Connector 17"/>
-            <p:cNvCxnSpPr>
-              <a:stCxn id="16" idx="2"/>
-            </p:cNvCxnSpPr>
-            <p:nvPr/>
-          </p:nvCxnSpPr>
-          <p:spPr>
-            <a:xfrm flipH="1">
-              <a:off x="7135003" y="2662238"/>
-              <a:ext cx="313766" cy="414787"/>
-            </a:xfrm>
-            <a:prstGeom prst="straightConnector1">
-              <a:avLst/>
-            </a:prstGeom>
-            <a:ln>
-              <a:tailEnd type="arrow"/>
-            </a:ln>
-          </p:spPr>
-          <p:style>
-            <a:lnRef idx="2">
-              <a:schemeClr val="accent1"/>
-            </a:lnRef>
-            <a:fillRef idx="0">
-              <a:schemeClr val="accent1"/>
-            </a:fillRef>
-            <a:effectRef idx="1">
-              <a:schemeClr val="accent1"/>
-            </a:effectRef>
-            <a:fontRef idx="minor">
-              <a:schemeClr val="tx1"/>
-            </a:fontRef>
-          </p:style>
-        </p:cxnSp>
-        <p:pic>
-          <p:nvPicPr>
-            <p:cNvPr id="19" name="Picture 18" descr="fargo.jpeg"/>
-            <p:cNvPicPr>
-              <a:picLocks noChangeAspect="1"/>
-            </p:cNvPicPr>
-            <p:nvPr/>
-          </p:nvPicPr>
-          <p:blipFill>
-            <a:blip r:embed="rId3">
-              <a:extLst>
-                <a:ext uri="{28A0092B-C50C-407E-A947-70E740481C1C}">
-                  <a14:useLocalDpi xmlns:a14="http://schemas.microsoft.com/office/drawing/2010/main" val="0"/>
-                </a:ext>
-              </a:extLst>
-            </a:blip>
-            <a:stretch>
-              <a:fillRect/>
-            </a:stretch>
-          </p:blipFill>
-          <p:spPr>
-            <a:xfrm>
-              <a:off x="6662190" y="3915501"/>
-              <a:ext cx="637786" cy="1084617"/>
-            </a:xfrm>
-            <a:prstGeom prst="rect">
-              <a:avLst/>
-            </a:prstGeom>
-          </p:spPr>
-        </p:pic>
-        <p:pic>
-          <p:nvPicPr>
-            <p:cNvPr id="20" name="Picture 19" descr="kill-bill.jpeg"/>
-            <p:cNvPicPr>
-              <a:picLocks noChangeAspect="1"/>
-            </p:cNvPicPr>
-            <p:nvPr/>
-          </p:nvPicPr>
-          <p:blipFill>
-            <a:blip r:embed="rId4">
-              <a:extLst>
-                <a:ext uri="{28A0092B-C50C-407E-A947-70E740481C1C}">
-                  <a14:useLocalDpi xmlns:a14="http://schemas.microsoft.com/office/drawing/2010/main" val="0"/>
-                </a:ext>
-              </a:extLst>
-            </a:blip>
-            <a:stretch>
-              <a:fillRect/>
-            </a:stretch>
-          </p:blipFill>
-          <p:spPr>
-            <a:xfrm>
-              <a:off x="7434543" y="3962399"/>
-              <a:ext cx="559954" cy="990820"/>
-            </a:xfrm>
-            <a:prstGeom prst="rect">
-              <a:avLst/>
-            </a:prstGeom>
-          </p:spPr>
-        </p:pic>
-        <p:sp>
-          <p:nvSpPr>
-            <p:cNvPr id="21" name="TextBox 20"/>
-            <p:cNvSpPr txBox="1"/>
-            <p:nvPr/>
-          </p:nvSpPr>
-          <p:spPr>
-            <a:xfrm>
-              <a:off x="7362476" y="3046697"/>
-              <a:ext cx="791883" cy="707886"/>
-            </a:xfrm>
-            <a:prstGeom prst="rect">
-              <a:avLst/>
-            </a:prstGeom>
-            <a:noFill/>
-          </p:spPr>
-          <p:txBody>
-            <a:bodyPr wrap="square" rtlCol="0">
-              <a:spAutoFit/>
-            </a:bodyPr>
-            <a:lstStyle/>
-            <a:p>
-              <a:r>
-                <a:rPr lang="en-US" sz="2000" dirty="0" smtClean="0">
-                  <a:solidFill>
-                    <a:srgbClr val="FF0000"/>
-                  </a:solidFill>
-                  <a:latin typeface="+mn-lt"/>
-                </a:rPr>
-                <a:t>False</a:t>
-              </a:r>
-            </a:p>
-            <a:p>
-              <a:r>
-                <a:rPr lang="en-US" sz="2000" dirty="0" smtClean="0">
-                  <a:solidFill>
-                    <a:srgbClr val="FF0000"/>
-                  </a:solidFill>
-                  <a:latin typeface="+mn-lt"/>
-                </a:rPr>
-                <a:t>n/a</a:t>
-              </a:r>
-              <a:endParaRPr lang="en-US" sz="2000" dirty="0">
-                <a:solidFill>
-                  <a:srgbClr val="FF0000"/>
-                </a:solidFill>
-                <a:latin typeface="+mn-lt"/>
-              </a:endParaRPr>
-            </a:p>
-          </p:txBody>
-        </p:sp>
-        <p:cxnSp>
-          <p:nvCxnSpPr>
-            <p:cNvPr id="22" name="Straight Arrow Connector 21"/>
-            <p:cNvCxnSpPr>
-              <a:stCxn id="19" idx="0"/>
-            </p:cNvCxnSpPr>
-            <p:nvPr/>
-          </p:nvCxnSpPr>
-          <p:spPr>
-            <a:xfrm flipV="1">
-              <a:off x="6981083" y="3678087"/>
-              <a:ext cx="0" cy="237414"/>
-            </a:xfrm>
-            <a:prstGeom prst="straightConnector1">
-              <a:avLst/>
-            </a:prstGeom>
-            <a:ln>
-              <a:tailEnd type="arrow"/>
-            </a:ln>
-          </p:spPr>
-          <p:style>
-            <a:lnRef idx="2">
-              <a:schemeClr val="accent1"/>
-            </a:lnRef>
-            <a:fillRef idx="0">
-              <a:schemeClr val="accent1"/>
-            </a:fillRef>
-            <a:effectRef idx="1">
-              <a:schemeClr val="accent1"/>
-            </a:effectRef>
-            <a:fontRef idx="minor">
-              <a:schemeClr val="tx1"/>
-            </a:fontRef>
-          </p:style>
-        </p:cxnSp>
-        <p:cxnSp>
-          <p:nvCxnSpPr>
-            <p:cNvPr id="23" name="Straight Arrow Connector 22"/>
-            <p:cNvCxnSpPr>
-              <a:stCxn id="16" idx="2"/>
-            </p:cNvCxnSpPr>
-            <p:nvPr/>
-          </p:nvCxnSpPr>
-          <p:spPr>
-            <a:xfrm>
-              <a:off x="7448769" y="2662238"/>
-              <a:ext cx="239057" cy="488890"/>
-            </a:xfrm>
-            <a:prstGeom prst="straightConnector1">
-              <a:avLst/>
-            </a:prstGeom>
-            <a:ln>
-              <a:tailEnd type="arrow"/>
-            </a:ln>
-          </p:spPr>
-          <p:style>
-            <a:lnRef idx="2">
-              <a:schemeClr val="accent1"/>
-            </a:lnRef>
-            <a:fillRef idx="0">
-              <a:schemeClr val="accent1"/>
-            </a:fillRef>
-            <a:effectRef idx="1">
-              <a:schemeClr val="accent1"/>
-            </a:effectRef>
-            <a:fontRef idx="minor">
-              <a:schemeClr val="tx1"/>
-            </a:fontRef>
-          </p:style>
-        </p:cxnSp>
-        <p:cxnSp>
-          <p:nvCxnSpPr>
-            <p:cNvPr id="24" name="Straight Arrow Connector 23"/>
-            <p:cNvCxnSpPr>
-              <a:stCxn id="20" idx="0"/>
-            </p:cNvCxnSpPr>
-            <p:nvPr/>
-          </p:nvCxnSpPr>
-          <p:spPr>
-            <a:xfrm flipH="1" flipV="1">
-              <a:off x="7687826" y="3678087"/>
-              <a:ext cx="26694" cy="284312"/>
-            </a:xfrm>
-            <a:prstGeom prst="straightConnector1">
-              <a:avLst/>
-            </a:prstGeom>
-            <a:ln>
-              <a:tailEnd type="arrow"/>
-            </a:ln>
-          </p:spPr>
-          <p:style>
-            <a:lnRef idx="2">
-              <a:schemeClr val="accent1"/>
-            </a:lnRef>
-            <a:fillRef idx="0">
-              <a:schemeClr val="accent1"/>
-            </a:fillRef>
-            <a:effectRef idx="1">
-              <a:schemeClr val="accent1"/>
-            </a:effectRef>
-            <a:fontRef idx="minor">
-              <a:schemeClr val="tx1"/>
-            </a:fontRef>
-          </p:style>
-        </p:cxnSp>
-        <p:sp>
-          <p:nvSpPr>
-            <p:cNvPr id="25" name="TextBox 24"/>
-            <p:cNvSpPr txBox="1"/>
-            <p:nvPr/>
-          </p:nvSpPr>
-          <p:spPr>
-            <a:xfrm>
-              <a:off x="6755497" y="709752"/>
-              <a:ext cx="1649506" cy="707886"/>
-            </a:xfrm>
-            <a:prstGeom prst="rect">
-              <a:avLst/>
-            </a:prstGeom>
-            <a:noFill/>
-          </p:spPr>
-          <p:txBody>
-            <a:bodyPr wrap="square" rtlCol="0">
-              <a:spAutoFit/>
-            </a:bodyPr>
-            <a:lstStyle/>
-            <a:p>
-              <a:r>
-                <a:rPr lang="en-US" sz="2000" dirty="0" smtClean="0">
-                  <a:solidFill>
-                    <a:srgbClr val="3366FF"/>
-                  </a:solidFill>
-                  <a:latin typeface="+mn-lt"/>
-                </a:rPr>
-                <a:t>gender</a:t>
-              </a:r>
-              <a:r>
-                <a:rPr lang="en-US" sz="2000" dirty="0" smtClean="0">
-                  <a:latin typeface="+mn-lt"/>
-                </a:rPr>
-                <a:t> = </a:t>
-              </a:r>
-              <a:r>
-                <a:rPr lang="en-US" sz="2000" dirty="0" smtClean="0">
-                  <a:solidFill>
-                    <a:srgbClr val="FF0000"/>
-                  </a:solidFill>
-                  <a:latin typeface="+mn-lt"/>
-                </a:rPr>
-                <a:t>Man</a:t>
-              </a:r>
-            </a:p>
-            <a:p>
-              <a:r>
-                <a:rPr lang="en-US" sz="2000" dirty="0" smtClean="0">
-                  <a:solidFill>
-                    <a:srgbClr val="3366FF"/>
-                  </a:solidFill>
-                  <a:latin typeface="+mn-lt"/>
-                </a:rPr>
-                <a:t>country</a:t>
-              </a:r>
-              <a:r>
-                <a:rPr lang="en-US" sz="2000" dirty="0" smtClean="0">
-                  <a:latin typeface="+mn-lt"/>
-                </a:rPr>
-                <a:t> = </a:t>
-              </a:r>
-              <a:r>
-                <a:rPr lang="en-US" sz="2000" dirty="0" smtClean="0">
-                  <a:solidFill>
-                    <a:srgbClr val="FF0000"/>
-                  </a:solidFill>
-                  <a:latin typeface="+mn-lt"/>
-                </a:rPr>
-                <a:t>U.S.</a:t>
-              </a:r>
-              <a:endParaRPr lang="en-US" sz="2000" dirty="0">
-                <a:solidFill>
-                  <a:srgbClr val="FF0000"/>
-                </a:solidFill>
-                <a:latin typeface="+mn-lt"/>
-              </a:endParaRPr>
-            </a:p>
-          </p:txBody>
-        </p:sp>
-        <p:sp>
-          <p:nvSpPr>
-            <p:cNvPr id="26" name="TextBox 25"/>
-            <p:cNvSpPr txBox="1"/>
-            <p:nvPr/>
-          </p:nvSpPr>
-          <p:spPr>
-            <a:xfrm>
-              <a:off x="6453716" y="5253962"/>
-              <a:ext cx="1951287" cy="707886"/>
-            </a:xfrm>
-            <a:prstGeom prst="rect">
-              <a:avLst/>
-            </a:prstGeom>
-            <a:noFill/>
-          </p:spPr>
-          <p:txBody>
-            <a:bodyPr wrap="square" rtlCol="0">
-              <a:spAutoFit/>
-            </a:bodyPr>
-            <a:lstStyle/>
-            <a:p>
-              <a:r>
-                <a:rPr lang="en-US" sz="2000" dirty="0" smtClean="0">
-                  <a:solidFill>
-                    <a:srgbClr val="3366FF"/>
-                  </a:solidFill>
-                  <a:latin typeface="+mn-lt"/>
-                </a:rPr>
-                <a:t>runtime</a:t>
-              </a:r>
-              <a:r>
-                <a:rPr lang="en-US" sz="2000" dirty="0" smtClean="0">
-                  <a:latin typeface="+mn-lt"/>
-                </a:rPr>
-                <a:t> = </a:t>
-              </a:r>
-              <a:r>
-                <a:rPr lang="en-US" sz="2000" dirty="0" smtClean="0">
-                  <a:solidFill>
-                    <a:srgbClr val="FF0000"/>
-                  </a:solidFill>
-                  <a:latin typeface="+mn-lt"/>
-                </a:rPr>
-                <a:t>98 min</a:t>
-              </a:r>
-            </a:p>
-            <a:p>
-              <a:r>
-                <a:rPr lang="en-US" sz="2000" dirty="0" smtClean="0">
-                  <a:solidFill>
-                    <a:srgbClr val="3366FF"/>
-                  </a:solidFill>
-                  <a:latin typeface="+mn-lt"/>
-                </a:rPr>
-                <a:t>drama</a:t>
-              </a:r>
-              <a:r>
-                <a:rPr lang="en-US" sz="2000" dirty="0" smtClean="0">
-                  <a:latin typeface="+mn-lt"/>
-                </a:rPr>
-                <a:t> = </a:t>
-              </a:r>
-              <a:r>
-                <a:rPr lang="en-US" sz="2000" dirty="0" smtClean="0">
-                  <a:solidFill>
-                    <a:srgbClr val="FF0000"/>
-                  </a:solidFill>
-                  <a:latin typeface="+mn-lt"/>
-                </a:rPr>
-                <a:t>true</a:t>
-              </a:r>
-              <a:endParaRPr lang="en-US" sz="2000" dirty="0">
-                <a:solidFill>
-                  <a:srgbClr val="FF0000"/>
-                </a:solidFill>
-                <a:latin typeface="+mn-lt"/>
-              </a:endParaRPr>
-            </a:p>
-          </p:txBody>
-        </p:sp>
-        <p:cxnSp>
-          <p:nvCxnSpPr>
-            <p:cNvPr id="27" name="Straight Connector 26"/>
-            <p:cNvCxnSpPr/>
-            <p:nvPr/>
-          </p:nvCxnSpPr>
-          <p:spPr>
-            <a:xfrm>
-              <a:off x="6981083" y="5000118"/>
-              <a:ext cx="0" cy="333615"/>
-            </a:xfrm>
-            <a:prstGeom prst="line">
-              <a:avLst/>
-            </a:prstGeom>
-          </p:spPr>
-          <p:style>
-            <a:lnRef idx="2">
-              <a:schemeClr val="accent1"/>
-            </a:lnRef>
-            <a:fillRef idx="0">
-              <a:schemeClr val="accent1"/>
-            </a:fillRef>
-            <a:effectRef idx="1">
-              <a:schemeClr val="accent1"/>
-            </a:effectRef>
-            <a:fontRef idx="minor">
-              <a:schemeClr val="tx1"/>
-            </a:fontRef>
-          </p:style>
-        </p:cxnSp>
-      </p:grpSp>
+              <a:t>Cell entry = instantiation proportion/count of feature for target instance</a:t>
+            </a:r>
+          </a:p>
+          <a:p>
+            <a:r>
+              <a:rPr lang="en-US" sz="2800" dirty="0" smtClean="0"/>
+              <a:t>We provide a tool for producing this data matrix automatically given a target </a:t>
+            </a:r>
+            <a:r>
+              <a:rPr lang="en-US" sz="2800" dirty="0" err="1" smtClean="0"/>
+              <a:t>functor</a:t>
+            </a:r>
+            <a:endParaRPr lang="en-US" sz="2800" dirty="0" smtClean="0"/>
+          </a:p>
+        </p:txBody>
+      </p:sp>
     </p:spTree>
     <p:extLst>
       <p:ext uri="{BB962C8B-B14F-4D97-AF65-F5344CB8AC3E}">
-        <p14:creationId xmlns:p14="http://schemas.microsoft.com/office/powerpoint/2010/main" val="793332068"/>
+        <p14:creationId xmlns:p14="http://schemas.microsoft.com/office/powerpoint/2010/main" val="3625095870"/>
       </p:ext>
     </p:extLst>
   </p:cSld>
@@ -25619,7 +24975,7 @@
   <p:timing>
     <p:tnLst>
       <p:par>
-        <p:cTn id="1" dur="indefinite" restart="never" nodeType="tmRoot"/>
+        <p:cTn xmlns:p14="http://schemas.microsoft.com/office/powerpoint/2010/main" id="1" dur="indefinite" restart="never" nodeType="tmRoot"/>
       </p:par>
     </p:tnLst>
   </p:timing>
@@ -25653,892 +25009,6 @@
             <p:ph type="title"/>
           </p:nvPr>
         </p:nvSpPr>
-        <p:spPr/>
-        <p:txBody>
-          <a:bodyPr/>
-          <a:lstStyle/>
-          <a:p>
-            <a:r>
-              <a:rPr lang="en-US" dirty="0" smtClean="0"/>
-              <a:t>Visualization</a:t>
-            </a:r>
-            <a:endParaRPr lang="en-US" dirty="0"/>
-          </a:p>
-        </p:txBody>
-      </p:sp>
-      <p:sp>
-        <p:nvSpPr>
-          <p:cNvPr id="3" name="Content Placeholder 2"/>
-          <p:cNvSpPr>
-            <a:spLocks noGrp="1"/>
-          </p:cNvSpPr>
-          <p:nvPr>
-            <p:ph sz="quarter" idx="1"/>
-          </p:nvPr>
-        </p:nvSpPr>
-        <p:spPr>
-          <a:xfrm>
-            <a:off x="914400" y="1447800"/>
-            <a:ext cx="7772400" cy="4306726"/>
-          </a:xfrm>
-        </p:spPr>
-        <p:txBody>
-          <a:bodyPr/>
-          <a:lstStyle/>
-          <a:p>
-            <a:r>
-              <a:rPr lang="en-US" sz="2800" dirty="0" smtClean="0"/>
-              <a:t>Learned features can be visualized in a data matrix</a:t>
-            </a:r>
-          </a:p>
-          <a:p>
-            <a:pPr lvl="1"/>
-            <a:r>
-              <a:rPr lang="en-US" dirty="0" smtClean="0"/>
-              <a:t>Row = target instance</a:t>
-            </a:r>
-          </a:p>
-          <a:p>
-            <a:pPr lvl="1"/>
-            <a:r>
-              <a:rPr lang="en-US" dirty="0"/>
-              <a:t>Column = conjunctive </a:t>
-            </a:r>
-            <a:r>
-              <a:rPr lang="en-US" dirty="0" smtClean="0"/>
-              <a:t>feature = child-parent value assignment</a:t>
-            </a:r>
-            <a:endParaRPr lang="en-US" dirty="0"/>
-          </a:p>
-          <a:p>
-            <a:pPr lvl="1"/>
-            <a:r>
-              <a:rPr lang="en-US" dirty="0" smtClean="0"/>
-              <a:t>Cell entry = instantiation proportion/count of feature for target instance</a:t>
-            </a:r>
-          </a:p>
-          <a:p>
-            <a:r>
-              <a:rPr lang="en-US" sz="2800" dirty="0" smtClean="0"/>
-              <a:t>We provide a tool for producing this data matrix automatically given a target </a:t>
-            </a:r>
-            <a:r>
-              <a:rPr lang="en-US" sz="2800" dirty="0" err="1" smtClean="0"/>
-              <a:t>functor</a:t>
-            </a:r>
-            <a:endParaRPr lang="en-US" sz="2800" dirty="0" smtClean="0"/>
-          </a:p>
-        </p:txBody>
-      </p:sp>
-    </p:spTree>
-    <p:extLst>
-      <p:ext uri="{BB962C8B-B14F-4D97-AF65-F5344CB8AC3E}">
-        <p14:creationId xmlns:p14="http://schemas.microsoft.com/office/powerpoint/2010/main" val="3625095870"/>
-      </p:ext>
-    </p:extLst>
-  </p:cSld>
-  <p:clrMapOvr>
-    <a:masterClrMapping/>
-  </p:clrMapOvr>
-  <p:timing>
-    <p:tnLst>
-      <p:par>
-        <p:cTn id="1" dur="indefinite" restart="never" nodeType="tmRoot"/>
-      </p:par>
-    </p:tnLst>
-  </p:timing>
-</p:sld>
-</file>
-
-<file path=ppt/slides/slide4.xml><?xml version="1.0" encoding="utf-8"?>
-<p:sld xmlns:a="http://schemas.openxmlformats.org/drawingml/2006/main" xmlns:r="http://schemas.openxmlformats.org/officeDocument/2006/relationships" xmlns:p="http://schemas.openxmlformats.org/presentationml/2006/main">
-  <p:cSld>
-    <p:spTree>
-      <p:nvGrpSpPr>
-        <p:cNvPr id="1" name=""/>
-        <p:cNvGrpSpPr/>
-        <p:nvPr/>
-      </p:nvGrpSpPr>
-      <p:grpSpPr>
-        <a:xfrm>
-          <a:off x="0" y="0"/>
-          <a:ext cx="0" cy="0"/>
-          <a:chOff x="0" y="0"/>
-          <a:chExt cx="0" cy="0"/>
-        </a:xfrm>
-      </p:grpSpPr>
-      <p:sp>
-        <p:nvSpPr>
-          <p:cNvPr id="2" name="Title 1"/>
-          <p:cNvSpPr>
-            <a:spLocks noGrp="1"/>
-          </p:cNvSpPr>
-          <p:nvPr>
-            <p:ph type="title"/>
-          </p:nvPr>
-        </p:nvSpPr>
-        <p:spPr>
-          <a:xfrm>
-            <a:off x="352790" y="274638"/>
-            <a:ext cx="8263450" cy="1143000"/>
-          </a:xfrm>
-        </p:spPr>
-        <p:txBody>
-          <a:bodyPr/>
-          <a:lstStyle/>
-          <a:p>
-            <a:r>
-              <a:rPr lang="en-US" dirty="0" smtClean="0"/>
-              <a:t>Two Kinds of Relational Probabilities</a:t>
-            </a:r>
-            <a:endParaRPr lang="en-US" dirty="0"/>
-          </a:p>
-        </p:txBody>
-      </p:sp>
-      <p:sp>
-        <p:nvSpPr>
-          <p:cNvPr id="4" name="Footer Placeholder 3"/>
-          <p:cNvSpPr>
-            <a:spLocks noGrp="1"/>
-          </p:cNvSpPr>
-          <p:nvPr>
-            <p:ph type="ftr" sz="quarter" idx="11"/>
-          </p:nvPr>
-        </p:nvSpPr>
-        <p:spPr>
-          <a:xfrm>
-            <a:off x="423350" y="6183233"/>
-            <a:ext cx="8720650" cy="457200"/>
-          </a:xfrm>
-        </p:spPr>
-        <p:txBody>
-          <a:bodyPr/>
-          <a:lstStyle/>
-          <a:p>
-            <a:r>
-              <a:rPr lang="en-US" dirty="0"/>
-              <a:t>Halpern, J. Y. (1990), 'An analysis of first-order logics of probability', </a:t>
-            </a:r>
-            <a:r>
-              <a:rPr lang="en-US" i="1" dirty="0"/>
-              <a:t>Artificial Intelligence </a:t>
-            </a:r>
-            <a:r>
-              <a:rPr lang="en-US" b="1" i="1" dirty="0"/>
-              <a:t>46(3), 311--350</a:t>
-            </a:r>
-            <a:r>
-              <a:rPr lang="en-US" b="1" i="1" dirty="0" smtClean="0"/>
-              <a:t>.</a:t>
-            </a:r>
-          </a:p>
-          <a:p>
-            <a:r>
-              <a:rPr lang="en-US" dirty="0"/>
-              <a:t>Bacchus, F. (1990), </a:t>
-            </a:r>
-            <a:r>
-              <a:rPr lang="en-US" i="1" dirty="0"/>
-              <a:t>Representing and Reasoning with Probabilistic Knowledge: A Logical Approach to Probabilities, </a:t>
-            </a:r>
-            <a:r>
-              <a:rPr lang="en-US" i="1"/>
-              <a:t>MIT </a:t>
-            </a:r>
-            <a:r>
-              <a:rPr lang="en-US" i="1" smtClean="0"/>
-              <a:t>Press.</a:t>
-            </a:r>
-            <a:endParaRPr lang="en-US" b="1" i="1" dirty="0"/>
-          </a:p>
-          <a:p>
-            <a:endParaRPr lang="en-US" dirty="0"/>
-          </a:p>
-        </p:txBody>
-      </p:sp>
-      <p:sp>
-        <p:nvSpPr>
-          <p:cNvPr id="5" name="TextBox 4"/>
-          <p:cNvSpPr txBox="1"/>
-          <p:nvPr/>
-        </p:nvSpPr>
-        <p:spPr>
-          <a:xfrm>
-            <a:off x="3767331" y="1830078"/>
-            <a:ext cx="1532819" cy="707886"/>
-          </a:xfrm>
-          <a:prstGeom prst="rect">
-            <a:avLst/>
-          </a:prstGeom>
-          <a:noFill/>
-          <a:ln>
-            <a:solidFill>
-              <a:schemeClr val="tx1"/>
-            </a:solidFill>
-          </a:ln>
-        </p:spPr>
-        <p:txBody>
-          <a:bodyPr wrap="square" rtlCol="0">
-            <a:spAutoFit/>
-          </a:bodyPr>
-          <a:lstStyle/>
-          <a:p>
-            <a:r>
-              <a:rPr lang="en-US" sz="2000" dirty="0" smtClean="0">
-                <a:latin typeface="+mn-lt"/>
-              </a:rPr>
-              <a:t>Relational Probability</a:t>
-            </a:r>
-            <a:endParaRPr lang="en-US" sz="2000" dirty="0">
-              <a:latin typeface="+mn-lt"/>
-            </a:endParaRPr>
-          </a:p>
-        </p:txBody>
-      </p:sp>
-      <p:sp>
-        <p:nvSpPr>
-          <p:cNvPr id="6" name="TextBox 5"/>
-          <p:cNvSpPr txBox="1"/>
-          <p:nvPr/>
-        </p:nvSpPr>
-        <p:spPr>
-          <a:xfrm>
-            <a:off x="141099" y="2638548"/>
-            <a:ext cx="3119855" cy="1015663"/>
-          </a:xfrm>
-          <a:prstGeom prst="rect">
-            <a:avLst/>
-          </a:prstGeom>
-          <a:noFill/>
-          <a:ln>
-            <a:solidFill>
-              <a:schemeClr val="tx1"/>
-            </a:solidFill>
-          </a:ln>
-        </p:spPr>
-        <p:txBody>
-          <a:bodyPr wrap="square" rtlCol="0">
-            <a:spAutoFit/>
-          </a:bodyPr>
-          <a:lstStyle/>
-          <a:p>
-            <a:r>
-              <a:rPr lang="en-US" sz="2000" dirty="0" smtClean="0">
-                <a:latin typeface="+mn-lt"/>
-              </a:rPr>
-              <a:t>Relational Frequency Statistics</a:t>
-            </a:r>
-          </a:p>
-          <a:p>
-            <a:r>
-              <a:rPr lang="en-US" sz="2000" dirty="0" smtClean="0">
-                <a:latin typeface="+mn-lt"/>
-              </a:rPr>
-              <a:t>type 1 probability</a:t>
-            </a:r>
-            <a:br>
-              <a:rPr lang="en-US" sz="2000" dirty="0" smtClean="0">
-                <a:latin typeface="+mn-lt"/>
-              </a:rPr>
-            </a:br>
-            <a:r>
-              <a:rPr lang="en-US" sz="2000" dirty="0" smtClean="0">
-                <a:latin typeface="+mn-lt"/>
-              </a:rPr>
-              <a:t>Class-level probability</a:t>
-            </a:r>
-            <a:endParaRPr lang="en-US" sz="2000" dirty="0">
-              <a:latin typeface="+mn-lt"/>
-            </a:endParaRPr>
-          </a:p>
-        </p:txBody>
-      </p:sp>
-      <p:sp>
-        <p:nvSpPr>
-          <p:cNvPr id="7" name="TextBox 6"/>
-          <p:cNvSpPr txBox="1"/>
-          <p:nvPr/>
-        </p:nvSpPr>
-        <p:spPr>
-          <a:xfrm>
-            <a:off x="5729917" y="2625931"/>
-            <a:ext cx="2956883" cy="1015663"/>
-          </a:xfrm>
-          <a:prstGeom prst="rect">
-            <a:avLst/>
-          </a:prstGeom>
-          <a:noFill/>
-          <a:ln>
-            <a:solidFill>
-              <a:schemeClr val="tx1"/>
-            </a:solidFill>
-          </a:ln>
-        </p:spPr>
-        <p:txBody>
-          <a:bodyPr wrap="square" rtlCol="0">
-            <a:spAutoFit/>
-          </a:bodyPr>
-          <a:lstStyle/>
-          <a:p>
-            <a:r>
-              <a:rPr lang="en-US" sz="2000" dirty="0" smtClean="0">
-                <a:latin typeface="+mn-lt"/>
-              </a:rPr>
-              <a:t>Degree of Belief</a:t>
-            </a:r>
-          </a:p>
-          <a:p>
-            <a:r>
-              <a:rPr lang="en-US" sz="2000" dirty="0" smtClean="0">
-                <a:latin typeface="+mn-lt"/>
-              </a:rPr>
-              <a:t>type 2 probability</a:t>
-            </a:r>
-          </a:p>
-          <a:p>
-            <a:r>
-              <a:rPr lang="en-US" sz="2000" dirty="0" smtClean="0">
-                <a:latin typeface="+mn-lt"/>
-              </a:rPr>
-              <a:t>Instance-level probability</a:t>
-            </a:r>
-          </a:p>
-        </p:txBody>
-      </p:sp>
-      <p:sp>
-        <p:nvSpPr>
-          <p:cNvPr id="8" name="Right Arrow 7"/>
-          <p:cNvSpPr/>
-          <p:nvPr/>
-        </p:nvSpPr>
-        <p:spPr>
-          <a:xfrm>
-            <a:off x="3401400" y="2846902"/>
-            <a:ext cx="2014563" cy="262786"/>
-          </a:xfrm>
-          <a:prstGeom prst="rightArrow">
-            <a:avLst/>
-          </a:prstGeom>
-        </p:spPr>
-        <p:style>
-          <a:lnRef idx="1">
-            <a:schemeClr val="accent1"/>
-          </a:lnRef>
-          <a:fillRef idx="3">
-            <a:schemeClr val="accent1"/>
-          </a:fillRef>
-          <a:effectRef idx="2">
-            <a:schemeClr val="accent1"/>
-          </a:effectRef>
-          <a:fontRef idx="minor">
-            <a:schemeClr val="lt1"/>
-          </a:fontRef>
-        </p:style>
-        <p:txBody>
-          <a:bodyPr rtlCol="0" anchor="ctr"/>
-          <a:lstStyle/>
-          <a:p>
-            <a:pPr algn="ctr"/>
-            <a:endParaRPr lang="en-US" sz="2000"/>
-          </a:p>
-        </p:txBody>
-      </p:sp>
-      <p:cxnSp>
-        <p:nvCxnSpPr>
-          <p:cNvPr id="9" name="Straight Connector 8"/>
-          <p:cNvCxnSpPr>
-            <a:stCxn id="5" idx="1"/>
-            <a:endCxn id="6" idx="0"/>
-          </p:cNvCxnSpPr>
-          <p:nvPr/>
-        </p:nvCxnSpPr>
-        <p:spPr>
-          <a:xfrm flipH="1">
-            <a:off x="1701027" y="2184021"/>
-            <a:ext cx="2066304" cy="454527"/>
-          </a:xfrm>
-          <a:prstGeom prst="line">
-            <a:avLst/>
-          </a:prstGeom>
-          <a:ln>
-            <a:solidFill>
-              <a:srgbClr val="3366FF"/>
-            </a:solidFill>
-          </a:ln>
-        </p:spPr>
-        <p:style>
-          <a:lnRef idx="2">
-            <a:schemeClr val="accent1"/>
-          </a:lnRef>
-          <a:fillRef idx="0">
-            <a:schemeClr val="accent1"/>
-          </a:fillRef>
-          <a:effectRef idx="1">
-            <a:schemeClr val="accent1"/>
-          </a:effectRef>
-          <a:fontRef idx="minor">
-            <a:schemeClr val="tx1"/>
-          </a:fontRef>
-        </p:style>
-      </p:cxnSp>
-      <p:cxnSp>
-        <p:nvCxnSpPr>
-          <p:cNvPr id="10" name="Straight Connector 9"/>
-          <p:cNvCxnSpPr>
-            <a:stCxn id="5" idx="3"/>
-            <a:endCxn id="7" idx="0"/>
-          </p:cNvCxnSpPr>
-          <p:nvPr/>
-        </p:nvCxnSpPr>
-        <p:spPr>
-          <a:xfrm>
-            <a:off x="5300150" y="2184021"/>
-            <a:ext cx="1908209" cy="441910"/>
-          </a:xfrm>
-          <a:prstGeom prst="line">
-            <a:avLst/>
-          </a:prstGeom>
-        </p:spPr>
-        <p:style>
-          <a:lnRef idx="2">
-            <a:schemeClr val="accent1"/>
-          </a:lnRef>
-          <a:fillRef idx="0">
-            <a:schemeClr val="accent1"/>
-          </a:fillRef>
-          <a:effectRef idx="1">
-            <a:schemeClr val="accent1"/>
-          </a:effectRef>
-          <a:fontRef idx="minor">
-            <a:schemeClr val="tx1"/>
-          </a:fontRef>
-        </p:style>
-      </p:cxnSp>
-      <p:sp>
-        <p:nvSpPr>
-          <p:cNvPr id="11" name="TextBox 10"/>
-          <p:cNvSpPr txBox="1"/>
-          <p:nvPr/>
-        </p:nvSpPr>
-        <p:spPr>
-          <a:xfrm>
-            <a:off x="846710" y="1865360"/>
-            <a:ext cx="2660530" cy="400110"/>
-          </a:xfrm>
-          <a:prstGeom prst="rect">
-            <a:avLst/>
-          </a:prstGeom>
-          <a:noFill/>
-        </p:spPr>
-        <p:txBody>
-          <a:bodyPr wrap="square" rtlCol="0">
-            <a:spAutoFit/>
-          </a:bodyPr>
-          <a:lstStyle/>
-          <a:p>
-            <a:r>
-              <a:rPr lang="en-US" sz="2000" dirty="0" smtClean="0">
-                <a:latin typeface="+mn-lt"/>
-              </a:rPr>
-              <a:t>P(first-order formulas)</a:t>
-            </a:r>
-            <a:endParaRPr lang="en-US" sz="2000" dirty="0">
-              <a:latin typeface="+mn-lt"/>
-            </a:endParaRPr>
-          </a:p>
-        </p:txBody>
-      </p:sp>
-      <p:sp>
-        <p:nvSpPr>
-          <p:cNvPr id="12" name="TextBox 11"/>
-          <p:cNvSpPr txBox="1"/>
-          <p:nvPr/>
-        </p:nvSpPr>
-        <p:spPr>
-          <a:xfrm>
-            <a:off x="6244468" y="1906090"/>
-            <a:ext cx="2442331" cy="400110"/>
-          </a:xfrm>
-          <a:prstGeom prst="rect">
-            <a:avLst/>
-          </a:prstGeom>
-          <a:noFill/>
-        </p:spPr>
-        <p:txBody>
-          <a:bodyPr wrap="square" rtlCol="0">
-            <a:spAutoFit/>
-          </a:bodyPr>
-          <a:lstStyle/>
-          <a:p>
-            <a:r>
-              <a:rPr lang="en-US" sz="2000" dirty="0" smtClean="0">
-                <a:latin typeface="+mn-lt"/>
-              </a:rPr>
-              <a:t>P(ground formulas)</a:t>
-            </a:r>
-            <a:endParaRPr lang="en-US" sz="2000" dirty="0">
-              <a:latin typeface="+mn-lt"/>
-            </a:endParaRPr>
-          </a:p>
-        </p:txBody>
-      </p:sp>
-      <p:sp>
-        <p:nvSpPr>
-          <p:cNvPr id="13" name="TextBox 12"/>
-          <p:cNvSpPr txBox="1"/>
-          <p:nvPr/>
-        </p:nvSpPr>
-        <p:spPr>
-          <a:xfrm>
-            <a:off x="3707959" y="2538337"/>
-            <a:ext cx="1708004" cy="400110"/>
-          </a:xfrm>
-          <a:prstGeom prst="rect">
-            <a:avLst/>
-          </a:prstGeom>
-          <a:noFill/>
-        </p:spPr>
-        <p:txBody>
-          <a:bodyPr wrap="square" rtlCol="0">
-            <a:spAutoFit/>
-          </a:bodyPr>
-          <a:lstStyle/>
-          <a:p>
-            <a:r>
-              <a:rPr lang="en-US" sz="2000" dirty="0" smtClean="0">
-                <a:latin typeface="+mn-lt"/>
-              </a:rPr>
-              <a:t>instantiate (?)</a:t>
-            </a:r>
-            <a:endParaRPr lang="en-US" sz="2000" dirty="0">
-              <a:latin typeface="+mn-lt"/>
-            </a:endParaRPr>
-          </a:p>
-        </p:txBody>
-      </p:sp>
-      <p:pic>
-        <p:nvPicPr>
-          <p:cNvPr id="20" name="Picture 19" descr="halpern.gif"/>
-          <p:cNvPicPr>
-            <a:picLocks noChangeAspect="1"/>
-          </p:cNvPicPr>
-          <p:nvPr/>
-        </p:nvPicPr>
-        <p:blipFill>
-          <a:blip r:embed="rId3" cstate="print"/>
-          <a:stretch>
-            <a:fillRect/>
-          </a:stretch>
-        </p:blipFill>
-        <p:spPr>
-          <a:xfrm>
-            <a:off x="427279" y="3977541"/>
-            <a:ext cx="2082800" cy="2082800"/>
-          </a:xfrm>
-          <a:prstGeom prst="rect">
-            <a:avLst/>
-          </a:prstGeom>
-        </p:spPr>
-      </p:pic>
-      <p:sp>
-        <p:nvSpPr>
-          <p:cNvPr id="21" name="TextBox 20"/>
-          <p:cNvSpPr txBox="1"/>
-          <p:nvPr/>
-        </p:nvSpPr>
-        <p:spPr>
-          <a:xfrm>
-            <a:off x="2909321" y="3977541"/>
-            <a:ext cx="5693330" cy="2246769"/>
-          </a:xfrm>
-          <a:prstGeom prst="rect">
-            <a:avLst/>
-          </a:prstGeom>
-          <a:noFill/>
-        </p:spPr>
-        <p:txBody>
-          <a:bodyPr wrap="square" rtlCol="0">
-            <a:spAutoFit/>
-          </a:bodyPr>
-          <a:lstStyle/>
-          <a:p>
-            <a:r>
-              <a:rPr lang="en-US" sz="2400" dirty="0" smtClean="0">
-                <a:latin typeface="+mn-lt"/>
-              </a:rPr>
-              <a:t>The Halpern </a:t>
-            </a:r>
-            <a:r>
-              <a:rPr lang="en-US" sz="2400" i="1" dirty="0" smtClean="0">
-                <a:latin typeface="+mn-lt"/>
-              </a:rPr>
-              <a:t>instantiation principle</a:t>
-            </a:r>
-            <a:r>
-              <a:rPr lang="en-US" sz="2400" dirty="0" smtClean="0">
-                <a:latin typeface="+mn-lt"/>
-              </a:rPr>
-              <a:t>:</a:t>
-            </a:r>
-          </a:p>
-          <a:p>
-            <a:endParaRPr lang="en-US" sz="2000" dirty="0">
-              <a:latin typeface="+mn-lt"/>
-            </a:endParaRPr>
-          </a:p>
-          <a:p>
-            <a:r>
-              <a:rPr lang="en-US" sz="2400" i="1" dirty="0" smtClean="0">
-                <a:latin typeface="+mn-lt"/>
-              </a:rPr>
-              <a:t>P(</a:t>
-            </a:r>
-            <a:r>
-              <a:rPr lang="en-US" sz="2400" i="1" dirty="0" err="1" smtClean="0">
-                <a:latin typeface="+mn-lt"/>
-              </a:rPr>
-              <a:t>φ</a:t>
-            </a:r>
-            <a:r>
-              <a:rPr lang="en-US" sz="2400" i="1" dirty="0" smtClean="0">
-                <a:latin typeface="+mn-lt"/>
-              </a:rPr>
-              <a:t>(X)) = P(</a:t>
-            </a:r>
-            <a:r>
-              <a:rPr lang="en-US" sz="2400" i="1" dirty="0" err="1" smtClean="0">
-                <a:latin typeface="+mn-lt"/>
-              </a:rPr>
-              <a:t>φ</a:t>
-            </a:r>
-            <a:r>
-              <a:rPr lang="en-US" sz="2400" i="1" dirty="0" smtClean="0">
-                <a:latin typeface="+mn-lt"/>
-              </a:rPr>
-              <a:t>(c))</a:t>
-            </a:r>
-            <a:endParaRPr lang="en-US" sz="2400" dirty="0">
-              <a:latin typeface="+mn-lt"/>
-            </a:endParaRPr>
-          </a:p>
-          <a:p>
-            <a:endParaRPr lang="en-US" sz="2000" dirty="0" smtClean="0">
-              <a:latin typeface="+mn-lt"/>
-            </a:endParaRPr>
-          </a:p>
-          <a:p>
-            <a:r>
-              <a:rPr lang="en-US" sz="2400" dirty="0" smtClean="0">
-                <a:latin typeface="+mn-lt"/>
-              </a:rPr>
-              <a:t>where </a:t>
-            </a:r>
-            <a:r>
-              <a:rPr lang="en-US" sz="2400" i="1" dirty="0" err="1" smtClean="0">
-                <a:latin typeface="+mn-lt"/>
-              </a:rPr>
-              <a:t>φ</a:t>
-            </a:r>
-            <a:r>
-              <a:rPr lang="en-US" sz="2400" i="1" dirty="0" smtClean="0">
-                <a:latin typeface="+mn-lt"/>
-              </a:rPr>
-              <a:t> </a:t>
-            </a:r>
-            <a:r>
-              <a:rPr lang="en-US" sz="2400" dirty="0" smtClean="0">
-                <a:latin typeface="+mn-lt"/>
-              </a:rPr>
-              <a:t>is a formula with free logical variable </a:t>
-            </a:r>
-            <a:r>
-              <a:rPr lang="en-US" sz="2400" i="1" dirty="0" smtClean="0">
-                <a:latin typeface="+mn-lt"/>
-              </a:rPr>
-              <a:t>X, </a:t>
-            </a:r>
-            <a:r>
-              <a:rPr lang="en-US" sz="2400" dirty="0" smtClean="0">
-                <a:latin typeface="+mn-lt"/>
-              </a:rPr>
-              <a:t>and </a:t>
-            </a:r>
-            <a:r>
-              <a:rPr lang="en-US" sz="2400" i="1" dirty="0" smtClean="0">
-                <a:latin typeface="+mn-lt"/>
-              </a:rPr>
-              <a:t>c</a:t>
-            </a:r>
-            <a:r>
-              <a:rPr lang="en-US" sz="2400" dirty="0" smtClean="0">
-                <a:latin typeface="+mn-lt"/>
-              </a:rPr>
-              <a:t> is a constant instantiating  </a:t>
-            </a:r>
-            <a:r>
-              <a:rPr lang="en-US" sz="2400" i="1" dirty="0" smtClean="0">
-                <a:latin typeface="+mn-lt"/>
-              </a:rPr>
-              <a:t>X</a:t>
-            </a:r>
-            <a:endParaRPr lang="en-US" sz="2400" dirty="0">
-              <a:latin typeface="+mn-lt"/>
-            </a:endParaRPr>
-          </a:p>
-        </p:txBody>
-      </p:sp>
-      <p:sp>
-        <p:nvSpPr>
-          <p:cNvPr id="15" name="TextBox 14"/>
-          <p:cNvSpPr txBox="1"/>
-          <p:nvPr/>
-        </p:nvSpPr>
-        <p:spPr>
-          <a:xfrm>
-            <a:off x="3701280" y="3109688"/>
-            <a:ext cx="1647463" cy="400110"/>
-          </a:xfrm>
-          <a:prstGeom prst="rect">
-            <a:avLst/>
-          </a:prstGeom>
-          <a:noFill/>
-        </p:spPr>
-        <p:txBody>
-          <a:bodyPr wrap="square" rtlCol="0">
-            <a:spAutoFit/>
-          </a:bodyPr>
-          <a:lstStyle/>
-          <a:p>
-            <a:r>
-              <a:rPr lang="en-US" sz="2000" dirty="0" smtClean="0">
-                <a:latin typeface="+mn-lt"/>
-              </a:rPr>
-              <a:t>inference (?)</a:t>
-            </a:r>
-            <a:endParaRPr lang="en-US" sz="2000" dirty="0">
-              <a:latin typeface="+mn-lt"/>
-            </a:endParaRPr>
-          </a:p>
-        </p:txBody>
-      </p:sp>
-    </p:spTree>
-    <p:extLst>
-      <p:ext uri="{BB962C8B-B14F-4D97-AF65-F5344CB8AC3E}">
-        <p14:creationId xmlns:p14="http://schemas.microsoft.com/office/powerpoint/2010/main" val="1278517344"/>
-      </p:ext>
-    </p:extLst>
-  </p:cSld>
-  <p:clrMapOvr>
-    <a:masterClrMapping/>
-  </p:clrMapOvr>
-  <p:timing>
-    <p:tnLst>
-      <p:par>
-        <p:cTn id="1" dur="indefinite" restart="never" nodeType="tmRoot">
-          <p:childTnLst>
-            <p:seq concurrent="1" nextAc="seek">
-              <p:cTn id="2" dur="indefinite" nodeType="mainSeq">
-                <p:childTnLst>
-                  <p:par>
-                    <p:cTn id="3" fill="hold">
-                      <p:stCondLst>
-                        <p:cond delay="indefinite"/>
-                      </p:stCondLst>
-                      <p:childTnLst>
-                        <p:par>
-                          <p:cTn id="4" fill="hold">
-                            <p:stCondLst>
-                              <p:cond delay="0"/>
-                            </p:stCondLst>
-                            <p:childTnLst>
-                              <p:par>
-                                <p:cTn id="5" presetID="1" presetClass="entr" presetSubtype="0" fill="hold" grpId="0" nodeType="clickEffect">
-                                  <p:stCondLst>
-                                    <p:cond delay="0"/>
-                                  </p:stCondLst>
-                                  <p:childTnLst>
-                                    <p:set>
-                                      <p:cBhvr>
-                                        <p:cTn id="6" dur="1" fill="hold">
-                                          <p:stCondLst>
-                                            <p:cond delay="0"/>
-                                          </p:stCondLst>
-                                        </p:cTn>
-                                        <p:tgtEl>
-                                          <p:spTgt spid="21"/>
-                                        </p:tgtEl>
-                                        <p:attrNameLst>
-                                          <p:attrName>style.visibility</p:attrName>
-                                        </p:attrNameLst>
-                                      </p:cBhvr>
-                                      <p:to>
-                                        <p:strVal val="visible"/>
-                                      </p:to>
-                                    </p:set>
-                                  </p:childTnLst>
-                                </p:cTn>
-                              </p:par>
-                            </p:childTnLst>
-                          </p:cTn>
-                        </p:par>
-                      </p:childTnLst>
-                    </p:cTn>
-                  </p:par>
-                </p:childTnLst>
-              </p:cTn>
-              <p:prevCondLst>
-                <p:cond evt="onPrev" delay="0">
-                  <p:tgtEl>
-                    <p:sldTgt/>
-                  </p:tgtEl>
-                </p:cond>
-              </p:prevCondLst>
-              <p:nextCondLst>
-                <p:cond evt="onNext" delay="0">
-                  <p:tgtEl>
-                    <p:sldTgt/>
-                  </p:tgtEl>
-                </p:cond>
-              </p:nextCondLst>
-            </p:seq>
-          </p:childTnLst>
-        </p:cTn>
-      </p:par>
-    </p:tnLst>
-    <p:bldLst>
-      <p:bldP spid="21" grpId="0"/>
-    </p:bldLst>
-  </p:timing>
-</p:sld>
-</file>
-
-<file path=ppt/slides/slide40.xml><?xml version="1.0" encoding="utf-8"?>
-<p:sld xmlns:a="http://schemas.openxmlformats.org/drawingml/2006/main" xmlns:r="http://schemas.openxmlformats.org/officeDocument/2006/relationships" xmlns:p="http://schemas.openxmlformats.org/presentationml/2006/main">
-  <p:cSld>
-    <p:spTree>
-      <p:nvGrpSpPr>
-        <p:cNvPr id="1" name=""/>
-        <p:cNvGrpSpPr/>
-        <p:nvPr/>
-      </p:nvGrpSpPr>
-      <p:grpSpPr>
-        <a:xfrm>
-          <a:off x="0" y="0"/>
-          <a:ext cx="0" cy="0"/>
-          <a:chOff x="0" y="0"/>
-          <a:chExt cx="0" cy="0"/>
-        </a:xfrm>
-      </p:grpSpPr>
-      <p:sp>
-        <p:nvSpPr>
-          <p:cNvPr id="2" name="Title 1"/>
-          <p:cNvSpPr>
-            <a:spLocks noGrp="1"/>
-          </p:cNvSpPr>
-          <p:nvPr>
-            <p:ph type="title"/>
-          </p:nvPr>
-        </p:nvSpPr>
         <p:spPr>
           <a:xfrm>
             <a:off x="330603" y="392676"/>
@@ -26567,7 +25037,7 @@
             <p:ph sz="quarter" idx="1"/>
             <p:extLst>
               <p:ext uri="{D42A27DB-BD31-4B8C-83A1-F6EECF244321}">
-                <p14:modId xmlns:p14="http://schemas.microsoft.com/office/powerpoint/2010/main" val="1179365082"/>
+                <p14:modId xmlns:p14="http://schemas.microsoft.com/office/powerpoint/2010/main" val="124796879"/>
               </p:ext>
             </p:extLst>
           </p:nvPr>
@@ -26708,7 +25178,7 @@
                     <a:p>
                       <a:r>
                         <a:rPr lang="en-US" sz="2400" dirty="0" smtClean="0"/>
-                        <a:t>user1</a:t>
+                        <a:t>sam</a:t>
                       </a:r>
                       <a:endParaRPr lang="en-US" sz="2400" dirty="0"/>
                     </a:p>
@@ -26722,7 +25192,7 @@
                     <a:p>
                       <a:r>
                         <a:rPr lang="en-US" sz="2400" dirty="0" smtClean="0"/>
-                        <a:t>W</a:t>
+                        <a:t>?</a:t>
                       </a:r>
                       <a:endParaRPr lang="en-US" sz="2400" dirty="0"/>
                     </a:p>
@@ -26765,8 +25235,8 @@
                     <a:lstStyle/>
                     <a:p>
                       <a:r>
-                        <a:rPr lang="en-US" sz="2400" dirty="0" smtClean="0"/>
-                        <a:t>user2</a:t>
+                        <a:rPr lang="en-US" sz="2400" dirty="0" err="1" smtClean="0"/>
+                        <a:t>jill</a:t>
                       </a:r>
                       <a:endParaRPr lang="en-US" sz="2400" dirty="0"/>
                     </a:p>
@@ -26780,7 +25250,7 @@
                     <a:p>
                       <a:r>
                         <a:rPr lang="en-US" sz="2400" dirty="0" smtClean="0"/>
-                        <a:t>M</a:t>
+                        <a:t>W</a:t>
                       </a:r>
                       <a:endParaRPr lang="en-US" sz="2400" dirty="0"/>
                     </a:p>
@@ -27272,7 +25742,1041 @@
   <p:timing>
     <p:tnLst>
       <p:par>
-        <p:cTn id="1" dur="indefinite" restart="never" nodeType="tmRoot"/>
+        <p:cTn xmlns:p14="http://schemas.microsoft.com/office/powerpoint/2010/main" id="1" dur="indefinite" restart="never" nodeType="tmRoot"/>
+      </p:par>
+    </p:tnLst>
+  </p:timing>
+</p:sld>
+</file>
+
+<file path=ppt/slides/slide4.xml><?xml version="1.0" encoding="utf-8"?>
+<p:sld xmlns:a="http://schemas.openxmlformats.org/drawingml/2006/main" xmlns:r="http://schemas.openxmlformats.org/officeDocument/2006/relationships" xmlns:p="http://schemas.openxmlformats.org/presentationml/2006/main">
+  <p:cSld>
+    <p:spTree>
+      <p:nvGrpSpPr>
+        <p:cNvPr id="1" name=""/>
+        <p:cNvGrpSpPr/>
+        <p:nvPr/>
+      </p:nvGrpSpPr>
+      <p:grpSpPr>
+        <a:xfrm>
+          <a:off x="0" y="0"/>
+          <a:ext cx="0" cy="0"/>
+          <a:chOff x="0" y="0"/>
+          <a:chExt cx="0" cy="0"/>
+        </a:xfrm>
+      </p:grpSpPr>
+      <p:sp>
+        <p:nvSpPr>
+          <p:cNvPr id="2" name="Title 1"/>
+          <p:cNvSpPr>
+            <a:spLocks noGrp="1"/>
+          </p:cNvSpPr>
+          <p:nvPr>
+            <p:ph type="title"/>
+          </p:nvPr>
+        </p:nvSpPr>
+        <p:spPr>
+          <a:xfrm>
+            <a:off x="352790" y="274638"/>
+            <a:ext cx="8263450" cy="1143000"/>
+          </a:xfrm>
+        </p:spPr>
+        <p:txBody>
+          <a:bodyPr/>
+          <a:lstStyle/>
+          <a:p>
+            <a:r>
+              <a:rPr lang="en-US" dirty="0" smtClean="0"/>
+              <a:t>Two Kinds of Relational Probabilities</a:t>
+            </a:r>
+            <a:endParaRPr lang="en-US" dirty="0"/>
+          </a:p>
+        </p:txBody>
+      </p:sp>
+      <p:sp>
+        <p:nvSpPr>
+          <p:cNvPr id="4" name="Footer Placeholder 3"/>
+          <p:cNvSpPr>
+            <a:spLocks noGrp="1"/>
+          </p:cNvSpPr>
+          <p:nvPr>
+            <p:ph type="ftr" sz="quarter" idx="11"/>
+          </p:nvPr>
+        </p:nvSpPr>
+        <p:spPr>
+          <a:xfrm>
+            <a:off x="423350" y="6183233"/>
+            <a:ext cx="8720650" cy="457200"/>
+          </a:xfrm>
+        </p:spPr>
+        <p:txBody>
+          <a:bodyPr/>
+          <a:lstStyle/>
+          <a:p>
+            <a:r>
+              <a:rPr lang="en-US" dirty="0"/>
+              <a:t>Halpern, J. Y. (1990), 'An analysis of first-order logics of probability', </a:t>
+            </a:r>
+            <a:r>
+              <a:rPr lang="en-US" i="1" dirty="0"/>
+              <a:t>Artificial Intelligence </a:t>
+            </a:r>
+            <a:r>
+              <a:rPr lang="en-US" b="1" i="1" dirty="0"/>
+              <a:t>46(3), 311--350</a:t>
+            </a:r>
+            <a:r>
+              <a:rPr lang="en-US" b="1" i="1" dirty="0" smtClean="0"/>
+              <a:t>.</a:t>
+            </a:r>
+          </a:p>
+          <a:p>
+            <a:r>
+              <a:rPr lang="en-US" dirty="0"/>
+              <a:t>Bacchus, F. (1990), </a:t>
+            </a:r>
+            <a:r>
+              <a:rPr lang="en-US" i="1" dirty="0"/>
+              <a:t>Representing and Reasoning with Probabilistic Knowledge: A Logical Approach to Probabilities, </a:t>
+            </a:r>
+            <a:r>
+              <a:rPr lang="en-US" i="1"/>
+              <a:t>MIT </a:t>
+            </a:r>
+            <a:r>
+              <a:rPr lang="en-US" i="1" smtClean="0"/>
+              <a:t>Press.</a:t>
+            </a:r>
+            <a:endParaRPr lang="en-US" b="1" i="1" dirty="0"/>
+          </a:p>
+          <a:p>
+            <a:endParaRPr lang="en-US" dirty="0"/>
+          </a:p>
+        </p:txBody>
+      </p:sp>
+      <p:sp>
+        <p:nvSpPr>
+          <p:cNvPr id="5" name="TextBox 4"/>
+          <p:cNvSpPr txBox="1"/>
+          <p:nvPr/>
+        </p:nvSpPr>
+        <p:spPr>
+          <a:xfrm>
+            <a:off x="3767331" y="1830078"/>
+            <a:ext cx="1532819" cy="707886"/>
+          </a:xfrm>
+          <a:prstGeom prst="rect">
+            <a:avLst/>
+          </a:prstGeom>
+          <a:noFill/>
+          <a:ln>
+            <a:solidFill>
+              <a:schemeClr val="tx1"/>
+            </a:solidFill>
+          </a:ln>
+        </p:spPr>
+        <p:txBody>
+          <a:bodyPr wrap="square" rtlCol="0">
+            <a:spAutoFit/>
+          </a:bodyPr>
+          <a:lstStyle/>
+          <a:p>
+            <a:r>
+              <a:rPr lang="en-US" sz="2000" dirty="0" smtClean="0">
+                <a:latin typeface="+mn-lt"/>
+              </a:rPr>
+              <a:t>Relational Probability</a:t>
+            </a:r>
+            <a:endParaRPr lang="en-US" sz="2000" dirty="0">
+              <a:latin typeface="+mn-lt"/>
+            </a:endParaRPr>
+          </a:p>
+        </p:txBody>
+      </p:sp>
+      <p:sp>
+        <p:nvSpPr>
+          <p:cNvPr id="6" name="TextBox 5"/>
+          <p:cNvSpPr txBox="1"/>
+          <p:nvPr/>
+        </p:nvSpPr>
+        <p:spPr>
+          <a:xfrm>
+            <a:off x="141099" y="2638548"/>
+            <a:ext cx="3119855" cy="1015663"/>
+          </a:xfrm>
+          <a:prstGeom prst="rect">
+            <a:avLst/>
+          </a:prstGeom>
+          <a:noFill/>
+          <a:ln>
+            <a:solidFill>
+              <a:schemeClr val="tx1"/>
+            </a:solidFill>
+          </a:ln>
+        </p:spPr>
+        <p:txBody>
+          <a:bodyPr wrap="square" rtlCol="0">
+            <a:spAutoFit/>
+          </a:bodyPr>
+          <a:lstStyle/>
+          <a:p>
+            <a:r>
+              <a:rPr lang="en-US" sz="2000" dirty="0" smtClean="0">
+                <a:latin typeface="+mn-lt"/>
+              </a:rPr>
+              <a:t>Relational Frequency Statistics</a:t>
+            </a:r>
+          </a:p>
+          <a:p>
+            <a:r>
+              <a:rPr lang="en-US" sz="2000" dirty="0" smtClean="0">
+                <a:latin typeface="+mn-lt"/>
+              </a:rPr>
+              <a:t>type 1 probability</a:t>
+            </a:r>
+            <a:br>
+              <a:rPr lang="en-US" sz="2000" dirty="0" smtClean="0">
+                <a:latin typeface="+mn-lt"/>
+              </a:rPr>
+            </a:br>
+            <a:r>
+              <a:rPr lang="en-US" sz="2000" dirty="0" smtClean="0">
+                <a:latin typeface="+mn-lt"/>
+              </a:rPr>
+              <a:t>Class-level probability</a:t>
+            </a:r>
+            <a:endParaRPr lang="en-US" sz="2000" dirty="0">
+              <a:latin typeface="+mn-lt"/>
+            </a:endParaRPr>
+          </a:p>
+        </p:txBody>
+      </p:sp>
+      <p:sp>
+        <p:nvSpPr>
+          <p:cNvPr id="7" name="TextBox 6"/>
+          <p:cNvSpPr txBox="1"/>
+          <p:nvPr/>
+        </p:nvSpPr>
+        <p:spPr>
+          <a:xfrm>
+            <a:off x="5729917" y="2625931"/>
+            <a:ext cx="2956883" cy="1015663"/>
+          </a:xfrm>
+          <a:prstGeom prst="rect">
+            <a:avLst/>
+          </a:prstGeom>
+          <a:noFill/>
+          <a:ln>
+            <a:solidFill>
+              <a:schemeClr val="tx1"/>
+            </a:solidFill>
+          </a:ln>
+        </p:spPr>
+        <p:txBody>
+          <a:bodyPr wrap="square" rtlCol="0">
+            <a:spAutoFit/>
+          </a:bodyPr>
+          <a:lstStyle/>
+          <a:p>
+            <a:r>
+              <a:rPr lang="en-US" sz="2000" dirty="0" smtClean="0">
+                <a:latin typeface="+mn-lt"/>
+              </a:rPr>
+              <a:t>Degree of Belief</a:t>
+            </a:r>
+          </a:p>
+          <a:p>
+            <a:r>
+              <a:rPr lang="en-US" sz="2000" dirty="0" smtClean="0">
+                <a:latin typeface="+mn-lt"/>
+              </a:rPr>
+              <a:t>type 2 probability</a:t>
+            </a:r>
+          </a:p>
+          <a:p>
+            <a:r>
+              <a:rPr lang="en-US" sz="2000" dirty="0" smtClean="0">
+                <a:latin typeface="+mn-lt"/>
+              </a:rPr>
+              <a:t>Instance-level probability</a:t>
+            </a:r>
+          </a:p>
+        </p:txBody>
+      </p:sp>
+      <p:sp>
+        <p:nvSpPr>
+          <p:cNvPr id="8" name="Right Arrow 7"/>
+          <p:cNvSpPr/>
+          <p:nvPr/>
+        </p:nvSpPr>
+        <p:spPr>
+          <a:xfrm>
+            <a:off x="3401400" y="2846902"/>
+            <a:ext cx="2014563" cy="262786"/>
+          </a:xfrm>
+          <a:prstGeom prst="rightArrow">
+            <a:avLst/>
+          </a:prstGeom>
+        </p:spPr>
+        <p:style>
+          <a:lnRef idx="1">
+            <a:schemeClr val="accent1"/>
+          </a:lnRef>
+          <a:fillRef idx="3">
+            <a:schemeClr val="accent1"/>
+          </a:fillRef>
+          <a:effectRef idx="2">
+            <a:schemeClr val="accent1"/>
+          </a:effectRef>
+          <a:fontRef idx="minor">
+            <a:schemeClr val="lt1"/>
+          </a:fontRef>
+        </p:style>
+        <p:txBody>
+          <a:bodyPr rtlCol="0" anchor="ctr"/>
+          <a:lstStyle/>
+          <a:p>
+            <a:pPr algn="ctr"/>
+            <a:endParaRPr lang="en-US" sz="2000"/>
+          </a:p>
+        </p:txBody>
+      </p:sp>
+      <p:cxnSp>
+        <p:nvCxnSpPr>
+          <p:cNvPr id="9" name="Straight Connector 8"/>
+          <p:cNvCxnSpPr>
+            <a:stCxn id="5" idx="1"/>
+            <a:endCxn id="6" idx="0"/>
+          </p:cNvCxnSpPr>
+          <p:nvPr/>
+        </p:nvCxnSpPr>
+        <p:spPr>
+          <a:xfrm flipH="1">
+            <a:off x="1701027" y="2184021"/>
+            <a:ext cx="2066304" cy="454527"/>
+          </a:xfrm>
+          <a:prstGeom prst="line">
+            <a:avLst/>
+          </a:prstGeom>
+          <a:ln>
+            <a:solidFill>
+              <a:srgbClr val="3366FF"/>
+            </a:solidFill>
+          </a:ln>
+        </p:spPr>
+        <p:style>
+          <a:lnRef idx="2">
+            <a:schemeClr val="accent1"/>
+          </a:lnRef>
+          <a:fillRef idx="0">
+            <a:schemeClr val="accent1"/>
+          </a:fillRef>
+          <a:effectRef idx="1">
+            <a:schemeClr val="accent1"/>
+          </a:effectRef>
+          <a:fontRef idx="minor">
+            <a:schemeClr val="tx1"/>
+          </a:fontRef>
+        </p:style>
+      </p:cxnSp>
+      <p:cxnSp>
+        <p:nvCxnSpPr>
+          <p:cNvPr id="10" name="Straight Connector 9"/>
+          <p:cNvCxnSpPr>
+            <a:stCxn id="5" idx="3"/>
+            <a:endCxn id="7" idx="0"/>
+          </p:cNvCxnSpPr>
+          <p:nvPr/>
+        </p:nvCxnSpPr>
+        <p:spPr>
+          <a:xfrm>
+            <a:off x="5300150" y="2184021"/>
+            <a:ext cx="1908209" cy="441910"/>
+          </a:xfrm>
+          <a:prstGeom prst="line">
+            <a:avLst/>
+          </a:prstGeom>
+        </p:spPr>
+        <p:style>
+          <a:lnRef idx="2">
+            <a:schemeClr val="accent1"/>
+          </a:lnRef>
+          <a:fillRef idx="0">
+            <a:schemeClr val="accent1"/>
+          </a:fillRef>
+          <a:effectRef idx="1">
+            <a:schemeClr val="accent1"/>
+          </a:effectRef>
+          <a:fontRef idx="minor">
+            <a:schemeClr val="tx1"/>
+          </a:fontRef>
+        </p:style>
+      </p:cxnSp>
+      <p:sp>
+        <p:nvSpPr>
+          <p:cNvPr id="11" name="TextBox 10"/>
+          <p:cNvSpPr txBox="1"/>
+          <p:nvPr/>
+        </p:nvSpPr>
+        <p:spPr>
+          <a:xfrm>
+            <a:off x="846710" y="1865360"/>
+            <a:ext cx="2660530" cy="400110"/>
+          </a:xfrm>
+          <a:prstGeom prst="rect">
+            <a:avLst/>
+          </a:prstGeom>
+          <a:noFill/>
+        </p:spPr>
+        <p:txBody>
+          <a:bodyPr wrap="square" rtlCol="0">
+            <a:spAutoFit/>
+          </a:bodyPr>
+          <a:lstStyle/>
+          <a:p>
+            <a:r>
+              <a:rPr lang="en-US" sz="2000" dirty="0" smtClean="0">
+                <a:latin typeface="+mn-lt"/>
+              </a:rPr>
+              <a:t>P(first-order formulas)</a:t>
+            </a:r>
+            <a:endParaRPr lang="en-US" sz="2000" dirty="0">
+              <a:latin typeface="+mn-lt"/>
+            </a:endParaRPr>
+          </a:p>
+        </p:txBody>
+      </p:sp>
+      <p:sp>
+        <p:nvSpPr>
+          <p:cNvPr id="12" name="TextBox 11"/>
+          <p:cNvSpPr txBox="1"/>
+          <p:nvPr/>
+        </p:nvSpPr>
+        <p:spPr>
+          <a:xfrm>
+            <a:off x="6244468" y="1906090"/>
+            <a:ext cx="2442331" cy="400110"/>
+          </a:xfrm>
+          <a:prstGeom prst="rect">
+            <a:avLst/>
+          </a:prstGeom>
+          <a:noFill/>
+        </p:spPr>
+        <p:txBody>
+          <a:bodyPr wrap="square" rtlCol="0">
+            <a:spAutoFit/>
+          </a:bodyPr>
+          <a:lstStyle/>
+          <a:p>
+            <a:r>
+              <a:rPr lang="en-US" sz="2000" dirty="0" smtClean="0">
+                <a:latin typeface="+mn-lt"/>
+              </a:rPr>
+              <a:t>P(ground formulas)</a:t>
+            </a:r>
+            <a:endParaRPr lang="en-US" sz="2000" dirty="0">
+              <a:latin typeface="+mn-lt"/>
+            </a:endParaRPr>
+          </a:p>
+        </p:txBody>
+      </p:sp>
+      <p:sp>
+        <p:nvSpPr>
+          <p:cNvPr id="13" name="TextBox 12"/>
+          <p:cNvSpPr txBox="1"/>
+          <p:nvPr/>
+        </p:nvSpPr>
+        <p:spPr>
+          <a:xfrm>
+            <a:off x="3707959" y="2538337"/>
+            <a:ext cx="1708004" cy="400110"/>
+          </a:xfrm>
+          <a:prstGeom prst="rect">
+            <a:avLst/>
+          </a:prstGeom>
+          <a:noFill/>
+        </p:spPr>
+        <p:txBody>
+          <a:bodyPr wrap="square" rtlCol="0">
+            <a:spAutoFit/>
+          </a:bodyPr>
+          <a:lstStyle/>
+          <a:p>
+            <a:r>
+              <a:rPr lang="en-US" sz="2000" dirty="0" smtClean="0">
+                <a:latin typeface="+mn-lt"/>
+              </a:rPr>
+              <a:t>instantiate (?)</a:t>
+            </a:r>
+            <a:endParaRPr lang="en-US" sz="2000" dirty="0">
+              <a:latin typeface="+mn-lt"/>
+            </a:endParaRPr>
+          </a:p>
+        </p:txBody>
+      </p:sp>
+      <p:pic>
+        <p:nvPicPr>
+          <p:cNvPr id="20" name="Picture 19" descr="halpern.gif"/>
+          <p:cNvPicPr>
+            <a:picLocks noChangeAspect="1"/>
+          </p:cNvPicPr>
+          <p:nvPr/>
+        </p:nvPicPr>
+        <p:blipFill>
+          <a:blip r:embed="rId3" cstate="print"/>
+          <a:stretch>
+            <a:fillRect/>
+          </a:stretch>
+        </p:blipFill>
+        <p:spPr>
+          <a:xfrm>
+            <a:off x="427279" y="3977541"/>
+            <a:ext cx="2082800" cy="2082800"/>
+          </a:xfrm>
+          <a:prstGeom prst="rect">
+            <a:avLst/>
+          </a:prstGeom>
+        </p:spPr>
+      </p:pic>
+      <p:sp>
+        <p:nvSpPr>
+          <p:cNvPr id="21" name="TextBox 20"/>
+          <p:cNvSpPr txBox="1"/>
+          <p:nvPr/>
+        </p:nvSpPr>
+        <p:spPr>
+          <a:xfrm>
+            <a:off x="2909321" y="3977541"/>
+            <a:ext cx="5693330" cy="2246769"/>
+          </a:xfrm>
+          <a:prstGeom prst="rect">
+            <a:avLst/>
+          </a:prstGeom>
+          <a:noFill/>
+        </p:spPr>
+        <p:txBody>
+          <a:bodyPr wrap="square" rtlCol="0">
+            <a:spAutoFit/>
+          </a:bodyPr>
+          <a:lstStyle/>
+          <a:p>
+            <a:r>
+              <a:rPr lang="en-US" sz="2400" dirty="0" smtClean="0">
+                <a:latin typeface="+mn-lt"/>
+              </a:rPr>
+              <a:t>The Halpern </a:t>
+            </a:r>
+            <a:r>
+              <a:rPr lang="en-US" sz="2400" i="1" dirty="0" smtClean="0">
+                <a:latin typeface="+mn-lt"/>
+              </a:rPr>
+              <a:t>instantiation principle</a:t>
+            </a:r>
+            <a:r>
+              <a:rPr lang="en-US" sz="2400" dirty="0" smtClean="0">
+                <a:latin typeface="+mn-lt"/>
+              </a:rPr>
+              <a:t>:</a:t>
+            </a:r>
+          </a:p>
+          <a:p>
+            <a:endParaRPr lang="en-US" sz="2000" dirty="0">
+              <a:latin typeface="+mn-lt"/>
+            </a:endParaRPr>
+          </a:p>
+          <a:p>
+            <a:r>
+              <a:rPr lang="en-US" sz="2400" i="1" dirty="0" smtClean="0">
+                <a:latin typeface="+mn-lt"/>
+              </a:rPr>
+              <a:t>P(</a:t>
+            </a:r>
+            <a:r>
+              <a:rPr lang="en-US" sz="2400" i="1" dirty="0" err="1" smtClean="0">
+                <a:latin typeface="+mn-lt"/>
+              </a:rPr>
+              <a:t>φ</a:t>
+            </a:r>
+            <a:r>
+              <a:rPr lang="en-US" sz="2400" i="1" dirty="0" smtClean="0">
+                <a:latin typeface="+mn-lt"/>
+              </a:rPr>
+              <a:t>(X)) = P(</a:t>
+            </a:r>
+            <a:r>
+              <a:rPr lang="en-US" sz="2400" i="1" dirty="0" err="1" smtClean="0">
+                <a:latin typeface="+mn-lt"/>
+              </a:rPr>
+              <a:t>φ</a:t>
+            </a:r>
+            <a:r>
+              <a:rPr lang="en-US" sz="2400" i="1" dirty="0" smtClean="0">
+                <a:latin typeface="+mn-lt"/>
+              </a:rPr>
+              <a:t>(c))</a:t>
+            </a:r>
+            <a:endParaRPr lang="en-US" sz="2400" dirty="0">
+              <a:latin typeface="+mn-lt"/>
+            </a:endParaRPr>
+          </a:p>
+          <a:p>
+            <a:endParaRPr lang="en-US" sz="2000" dirty="0" smtClean="0">
+              <a:latin typeface="+mn-lt"/>
+            </a:endParaRPr>
+          </a:p>
+          <a:p>
+            <a:r>
+              <a:rPr lang="en-US" sz="2400" dirty="0" smtClean="0">
+                <a:latin typeface="+mn-lt"/>
+              </a:rPr>
+              <a:t>where </a:t>
+            </a:r>
+            <a:r>
+              <a:rPr lang="en-US" sz="2400" i="1" dirty="0" err="1" smtClean="0">
+                <a:latin typeface="+mn-lt"/>
+              </a:rPr>
+              <a:t>φ</a:t>
+            </a:r>
+            <a:r>
+              <a:rPr lang="en-US" sz="2400" i="1" dirty="0" smtClean="0">
+                <a:latin typeface="+mn-lt"/>
+              </a:rPr>
+              <a:t> </a:t>
+            </a:r>
+            <a:r>
+              <a:rPr lang="en-US" sz="2400" dirty="0" smtClean="0">
+                <a:latin typeface="+mn-lt"/>
+              </a:rPr>
+              <a:t>is a formula with free logical variable </a:t>
+            </a:r>
+            <a:r>
+              <a:rPr lang="en-US" sz="2400" i="1" dirty="0" smtClean="0">
+                <a:latin typeface="+mn-lt"/>
+              </a:rPr>
+              <a:t>X, </a:t>
+            </a:r>
+            <a:r>
+              <a:rPr lang="en-US" sz="2400" dirty="0" smtClean="0">
+                <a:latin typeface="+mn-lt"/>
+              </a:rPr>
+              <a:t>and </a:t>
+            </a:r>
+            <a:r>
+              <a:rPr lang="en-US" sz="2400" i="1" dirty="0" smtClean="0">
+                <a:latin typeface="+mn-lt"/>
+              </a:rPr>
+              <a:t>c</a:t>
+            </a:r>
+            <a:r>
+              <a:rPr lang="en-US" sz="2400" dirty="0" smtClean="0">
+                <a:latin typeface="+mn-lt"/>
+              </a:rPr>
+              <a:t> is a constant instantiating  </a:t>
+            </a:r>
+            <a:r>
+              <a:rPr lang="en-US" sz="2400" i="1" dirty="0" smtClean="0">
+                <a:latin typeface="+mn-lt"/>
+              </a:rPr>
+              <a:t>X</a:t>
+            </a:r>
+            <a:endParaRPr lang="en-US" sz="2400" dirty="0">
+              <a:latin typeface="+mn-lt"/>
+            </a:endParaRPr>
+          </a:p>
+        </p:txBody>
+      </p:sp>
+      <p:sp>
+        <p:nvSpPr>
+          <p:cNvPr id="15" name="TextBox 14"/>
+          <p:cNvSpPr txBox="1"/>
+          <p:nvPr/>
+        </p:nvSpPr>
+        <p:spPr>
+          <a:xfrm>
+            <a:off x="3701280" y="3109688"/>
+            <a:ext cx="1647463" cy="400110"/>
+          </a:xfrm>
+          <a:prstGeom prst="rect">
+            <a:avLst/>
+          </a:prstGeom>
+          <a:noFill/>
+        </p:spPr>
+        <p:txBody>
+          <a:bodyPr wrap="square" rtlCol="0">
+            <a:spAutoFit/>
+          </a:bodyPr>
+          <a:lstStyle/>
+          <a:p>
+            <a:r>
+              <a:rPr lang="en-US" sz="2000" dirty="0" smtClean="0">
+                <a:latin typeface="+mn-lt"/>
+              </a:rPr>
+              <a:t>inference (?)</a:t>
+            </a:r>
+            <a:endParaRPr lang="en-US" sz="2000" dirty="0">
+              <a:latin typeface="+mn-lt"/>
+            </a:endParaRPr>
+          </a:p>
+        </p:txBody>
+      </p:sp>
+    </p:spTree>
+    <p:extLst>
+      <p:ext uri="{BB962C8B-B14F-4D97-AF65-F5344CB8AC3E}">
+        <p14:creationId xmlns:p14="http://schemas.microsoft.com/office/powerpoint/2010/main" val="1278517344"/>
+      </p:ext>
+    </p:extLst>
+  </p:cSld>
+  <p:clrMapOvr>
+    <a:masterClrMapping/>
+  </p:clrMapOvr>
+  <p:timing>
+    <p:tnLst>
+      <p:par>
+        <p:cTn xmlns:p14="http://schemas.microsoft.com/office/powerpoint/2010/main" id="1" dur="indefinite" restart="never" nodeType="tmRoot">
+          <p:childTnLst>
+            <p:seq concurrent="1" nextAc="seek">
+              <p:cTn id="2" dur="indefinite" nodeType="mainSeq">
+                <p:childTnLst>
+                  <p:par>
+                    <p:cTn id="3" fill="hold">
+                      <p:stCondLst>
+                        <p:cond delay="indefinite"/>
+                      </p:stCondLst>
+                      <p:childTnLst>
+                        <p:par>
+                          <p:cTn id="4" fill="hold">
+                            <p:stCondLst>
+                              <p:cond delay="0"/>
+                            </p:stCondLst>
+                            <p:childTnLst>
+                              <p:par>
+                                <p:cTn id="5" presetID="1" presetClass="entr" presetSubtype="0" fill="hold" grpId="0" nodeType="clickEffect">
+                                  <p:stCondLst>
+                                    <p:cond delay="0"/>
+                                  </p:stCondLst>
+                                  <p:childTnLst>
+                                    <p:set>
+                                      <p:cBhvr>
+                                        <p:cTn id="6" dur="1" fill="hold">
+                                          <p:stCondLst>
+                                            <p:cond delay="0"/>
+                                          </p:stCondLst>
+                                        </p:cTn>
+                                        <p:tgtEl>
+                                          <p:spTgt spid="21"/>
+                                        </p:tgtEl>
+                                        <p:attrNameLst>
+                                          <p:attrName>style.visibility</p:attrName>
+                                        </p:attrNameLst>
+                                      </p:cBhvr>
+                                      <p:to>
+                                        <p:strVal val="visible"/>
+                                      </p:to>
+                                    </p:set>
+                                  </p:childTnLst>
+                                </p:cTn>
+                              </p:par>
+                            </p:childTnLst>
+                          </p:cTn>
+                        </p:par>
+                      </p:childTnLst>
+                    </p:cTn>
+                  </p:par>
+                </p:childTnLst>
+              </p:cTn>
+              <p:prevCondLst>
+                <p:cond evt="onPrev" delay="0">
+                  <p:tgtEl>
+                    <p:sldTgt/>
+                  </p:tgtEl>
+                </p:cond>
+              </p:prevCondLst>
+              <p:nextCondLst>
+                <p:cond evt="onNext" delay="0">
+                  <p:tgtEl>
+                    <p:sldTgt/>
+                  </p:tgtEl>
+                </p:cond>
+              </p:nextCondLst>
+            </p:seq>
+          </p:childTnLst>
+        </p:cTn>
+      </p:par>
+    </p:tnLst>
+    <p:bldLst>
+      <p:bldP spid="21" grpId="0"/>
+    </p:bldLst>
+  </p:timing>
+</p:sld>
+</file>
+
+<file path=ppt/slides/slide40.xml><?xml version="1.0" encoding="utf-8"?>
+<p:sld xmlns:a="http://schemas.openxmlformats.org/drawingml/2006/main" xmlns:r="http://schemas.openxmlformats.org/officeDocument/2006/relationships" xmlns:p="http://schemas.openxmlformats.org/presentationml/2006/main">
+  <p:cSld>
+    <p:spTree>
+      <p:nvGrpSpPr>
+        <p:cNvPr id="1" name=""/>
+        <p:cNvGrpSpPr/>
+        <p:nvPr/>
+      </p:nvGrpSpPr>
+      <p:grpSpPr>
+        <a:xfrm>
+          <a:off x="0" y="0"/>
+          <a:ext cx="0" cy="0"/>
+          <a:chOff x="0" y="0"/>
+          <a:chExt cx="0" cy="0"/>
+        </a:xfrm>
+      </p:grpSpPr>
+      <p:sp>
+        <p:nvSpPr>
+          <p:cNvPr id="2" name="Title 1"/>
+          <p:cNvSpPr>
+            <a:spLocks noGrp="1"/>
+          </p:cNvSpPr>
+          <p:nvPr>
+            <p:ph type="title"/>
+          </p:nvPr>
+        </p:nvSpPr>
+        <p:spPr/>
+        <p:txBody>
+          <a:bodyPr/>
+          <a:lstStyle/>
+          <a:p>
+            <a:r>
+              <a:rPr lang="en-US" dirty="0" smtClean="0"/>
+              <a:t>Propositionalization</a:t>
+            </a:r>
+            <a:endParaRPr lang="en-US" dirty="0"/>
+          </a:p>
+        </p:txBody>
+      </p:sp>
+      <p:sp>
+        <p:nvSpPr>
+          <p:cNvPr id="3" name="Content Placeholder 2"/>
+          <p:cNvSpPr>
+            <a:spLocks noGrp="1"/>
+          </p:cNvSpPr>
+          <p:nvPr>
+            <p:ph sz="quarter" idx="1"/>
+          </p:nvPr>
+        </p:nvSpPr>
+        <p:spPr>
+          <a:xfrm>
+            <a:off x="914400" y="1447800"/>
+            <a:ext cx="7772400" cy="4275367"/>
+          </a:xfrm>
+        </p:spPr>
+        <p:txBody>
+          <a:bodyPr/>
+          <a:lstStyle/>
+          <a:p>
+            <a:r>
+              <a:rPr lang="en-US" sz="2800" dirty="0" smtClean="0"/>
+              <a:t>The data matrix can be treated as a pseudo-</a:t>
+            </a:r>
+            <a:r>
+              <a:rPr lang="en-US" sz="2800" dirty="0" err="1" smtClean="0"/>
+              <a:t>i.i.d</a:t>
+            </a:r>
+            <a:r>
+              <a:rPr lang="en-US" sz="2800" dirty="0" smtClean="0"/>
+              <a:t>. view (Lippi et al., </a:t>
+            </a:r>
+            <a:r>
+              <a:rPr lang="en-US" sz="2800" dirty="0" err="1" smtClean="0"/>
+              <a:t>Lavrac</a:t>
+            </a:r>
+            <a:r>
+              <a:rPr lang="en-US" sz="2800" dirty="0" smtClean="0"/>
+              <a:t> et al.)</a:t>
+            </a:r>
+          </a:p>
+          <a:p>
+            <a:pPr lvl="1">
+              <a:buFont typeface="Wingdings" charset="2"/>
+              <a:buChar char="Ø"/>
+            </a:pPr>
+            <a:r>
+              <a:rPr lang="en-US" dirty="0" smtClean="0"/>
+              <a:t>provide as input to classification learners for </a:t>
+            </a:r>
+            <a:r>
+              <a:rPr lang="en-US" dirty="0" err="1" smtClean="0"/>
+              <a:t>i.i.d</a:t>
+            </a:r>
+            <a:r>
+              <a:rPr lang="en-US" dirty="0" smtClean="0"/>
+              <a:t>. data</a:t>
+            </a:r>
+          </a:p>
+          <a:p>
+            <a:r>
+              <a:rPr lang="en-US" sz="2800" dirty="0" smtClean="0"/>
+              <a:t>Converting relational data to features for </a:t>
+            </a:r>
+            <a:r>
+              <a:rPr lang="en-US" sz="2800" dirty="0" err="1" smtClean="0"/>
+              <a:t>i.i.d</a:t>
+            </a:r>
+            <a:r>
+              <a:rPr lang="en-US" sz="2800" dirty="0" smtClean="0"/>
+              <a:t>. learning is called </a:t>
+            </a:r>
+            <a:r>
+              <a:rPr lang="en-US" sz="2800" b="1" dirty="0" err="1" smtClean="0"/>
+              <a:t>propositionalization</a:t>
+            </a:r>
+            <a:endParaRPr lang="en-US" sz="2800" dirty="0" smtClean="0"/>
+          </a:p>
+          <a:p>
+            <a:pPr lvl="1"/>
+            <a:r>
+              <a:rPr lang="en-US" dirty="0" smtClean="0"/>
+              <a:t>A </a:t>
+            </a:r>
+            <a:r>
+              <a:rPr lang="en-US" dirty="0"/>
+              <a:t>form of Extract, </a:t>
+            </a:r>
+            <a:r>
+              <a:rPr lang="en-US" dirty="0" smtClean="0"/>
+              <a:t>Transform, Load</a:t>
+            </a:r>
+          </a:p>
+          <a:p>
+            <a:r>
+              <a:rPr lang="en-US" sz="2800" dirty="0" smtClean="0"/>
+              <a:t>Features in a pseudo </a:t>
+            </a:r>
+            <a:r>
+              <a:rPr lang="en-US" sz="2800" dirty="0" err="1" smtClean="0"/>
+              <a:t>i.i.d</a:t>
+            </a:r>
+            <a:r>
+              <a:rPr lang="en-US" sz="2800" dirty="0" smtClean="0"/>
+              <a:t>. data view are often computed using aggregate functions (e.g. average, mode)</a:t>
+            </a:r>
+          </a:p>
+          <a:p>
+            <a:r>
+              <a:rPr lang="en-US" sz="2800" dirty="0" smtClean="0"/>
+              <a:t>See anomaly supplement for movie world example</a:t>
+            </a:r>
+          </a:p>
+          <a:p>
+            <a:endParaRPr lang="en-US" sz="2800" dirty="0"/>
+          </a:p>
+        </p:txBody>
+      </p:sp>
+      <p:sp>
+        <p:nvSpPr>
+          <p:cNvPr id="4" name="Footer Placeholder 3"/>
+          <p:cNvSpPr>
+            <a:spLocks noGrp="1"/>
+          </p:cNvSpPr>
+          <p:nvPr>
+            <p:ph type="ftr" sz="quarter" idx="11"/>
+          </p:nvPr>
+        </p:nvSpPr>
+        <p:spPr>
+          <a:xfrm>
+            <a:off x="391943" y="5911325"/>
+            <a:ext cx="8105354" cy="658557"/>
+          </a:xfrm>
+        </p:spPr>
+        <p:txBody>
+          <a:bodyPr/>
+          <a:lstStyle/>
+          <a:p>
+            <a:r>
+              <a:rPr lang="en-US" dirty="0"/>
+              <a:t>Lippi, M.; Jaeger, M.; </a:t>
+            </a:r>
+            <a:r>
+              <a:rPr lang="en-US" dirty="0" err="1"/>
+              <a:t>Frasconi</a:t>
+            </a:r>
+            <a:r>
+              <a:rPr lang="en-US" dirty="0"/>
+              <a:t>, P. &amp; </a:t>
+            </a:r>
+            <a:r>
+              <a:rPr lang="en-US" dirty="0" err="1"/>
+              <a:t>Passerini</a:t>
+            </a:r>
+            <a:r>
+              <a:rPr lang="en-US" dirty="0"/>
+              <a:t>, A. (2011), 'Relational information gain', </a:t>
+            </a:r>
+            <a:r>
+              <a:rPr lang="en-US" i="1" dirty="0"/>
+              <a:t>Machine Learning </a:t>
+            </a:r>
+            <a:r>
+              <a:rPr lang="en-US" b="1" i="1" dirty="0"/>
+              <a:t>83(2), 219--239</a:t>
+            </a:r>
+            <a:r>
+              <a:rPr lang="en-US" b="1" i="1" dirty="0" smtClean="0"/>
+              <a:t>.</a:t>
+            </a:r>
+          </a:p>
+          <a:p>
+            <a:r>
+              <a:rPr lang="en-US" dirty="0" err="1"/>
+              <a:t>Lavrac</a:t>
+            </a:r>
+            <a:r>
+              <a:rPr lang="en-US" dirty="0"/>
+              <a:t>, N.; </a:t>
+            </a:r>
+            <a:r>
+              <a:rPr lang="en-US" dirty="0" err="1"/>
+              <a:t>Perovsek</a:t>
+            </a:r>
+            <a:r>
+              <a:rPr lang="en-US" dirty="0"/>
+              <a:t>, M. &amp; </a:t>
+            </a:r>
+            <a:r>
+              <a:rPr lang="en-US" dirty="0" err="1"/>
+              <a:t>Vavpetic</a:t>
+            </a:r>
+            <a:r>
+              <a:rPr lang="en-US" dirty="0"/>
+              <a:t>, A. (2014), Propositionalization </a:t>
+            </a:r>
+            <a:r>
+              <a:rPr lang="en-US" dirty="0" err="1"/>
+              <a:t>Online'ECML</a:t>
+            </a:r>
+            <a:r>
+              <a:rPr lang="en-US" dirty="0"/>
+              <a:t>', Springer, , pp. </a:t>
+            </a:r>
+            <a:r>
+              <a:rPr lang="en-US" dirty="0" smtClean="0"/>
+              <a:t>456—459.</a:t>
+            </a:r>
+            <a:endParaRPr lang="en-US" b="1" i="1" dirty="0"/>
+          </a:p>
+        </p:txBody>
+      </p:sp>
+    </p:spTree>
+    <p:extLst>
+      <p:ext uri="{BB962C8B-B14F-4D97-AF65-F5344CB8AC3E}">
+        <p14:creationId xmlns:p14="http://schemas.microsoft.com/office/powerpoint/2010/main" val="3360765377"/>
+      </p:ext>
+    </p:extLst>
+  </p:cSld>
+  <p:clrMapOvr>
+    <a:masterClrMapping/>
+  </p:clrMapOvr>
+  <p:timing>
+    <p:tnLst>
+      <p:par>
+        <p:cTn xmlns:p14="http://schemas.microsoft.com/office/powerpoint/2010/main" id="1" dur="indefinite" restart="never" nodeType="tmRoot"/>
       </p:par>
     </p:tnLst>
   </p:timing>
@@ -27298,7 +26802,7 @@
       </p:grpSpPr>
       <p:sp>
         <p:nvSpPr>
-          <p:cNvPr id="2" name="Title 1"/>
+          <p:cNvPr id="5" name="Title 4"/>
           <p:cNvSpPr>
             <a:spLocks noGrp="1"/>
           </p:cNvSpPr>
@@ -27313,7 +26817,7 @@
           <a:p>
             <a:r>
               <a:rPr lang="en-US" dirty="0" smtClean="0"/>
-              <a:t>Propositionalization</a:t>
+              <a:t>Dependency Networks</a:t>
             </a:r>
             <a:endParaRPr lang="en-US" dirty="0"/>
           </a:p>
@@ -27321,122 +26825,20 @@
       </p:sp>
       <p:sp>
         <p:nvSpPr>
-          <p:cNvPr id="3" name="Content Placeholder 2"/>
+          <p:cNvPr id="6" name="Text Placeholder 5"/>
           <p:cNvSpPr>
             <a:spLocks noGrp="1"/>
           </p:cNvSpPr>
           <p:nvPr>
-            <p:ph sz="quarter" idx="1"/>
+            <p:ph type="body" idx="1"/>
           </p:nvPr>
         </p:nvSpPr>
-        <p:spPr>
-          <a:xfrm>
-            <a:off x="914400" y="1447800"/>
-            <a:ext cx="7772400" cy="4275367"/>
-          </a:xfrm>
-        </p:spPr>
+        <p:spPr/>
         <p:txBody>
           <a:bodyPr/>
           <a:lstStyle/>
           <a:p>
-            <a:r>
-              <a:rPr lang="en-US" sz="2800" dirty="0" smtClean="0"/>
-              <a:t>The data matrix can be treated as a pseudo-</a:t>
-            </a:r>
-            <a:r>
-              <a:rPr lang="en-US" sz="2800" dirty="0" err="1" smtClean="0"/>
-              <a:t>i.i.d</a:t>
-            </a:r>
-            <a:r>
-              <a:rPr lang="en-US" sz="2800" dirty="0" smtClean="0"/>
-              <a:t>. view (Lippi et al., </a:t>
-            </a:r>
-            <a:r>
-              <a:rPr lang="en-US" sz="2800" dirty="0" err="1" smtClean="0"/>
-              <a:t>Lavrac</a:t>
-            </a:r>
-            <a:r>
-              <a:rPr lang="en-US" sz="2800" dirty="0" smtClean="0"/>
-              <a:t> et al.)</a:t>
-            </a:r>
-          </a:p>
-          <a:p>
-            <a:pPr lvl="1">
-              <a:buFont typeface="Wingdings" charset="2"/>
-              <a:buChar char="Ø"/>
-            </a:pPr>
-            <a:r>
-              <a:rPr lang="en-US" dirty="0" smtClean="0"/>
-              <a:t>provide as input to classification learners for </a:t>
-            </a:r>
-            <a:r>
-              <a:rPr lang="en-US" dirty="0" err="1" smtClean="0"/>
-              <a:t>i.i.d</a:t>
-            </a:r>
-            <a:r>
-              <a:rPr lang="en-US" dirty="0" smtClean="0"/>
-              <a:t>. data</a:t>
-            </a:r>
-          </a:p>
-          <a:p>
-            <a:r>
-              <a:rPr lang="en-US" sz="2800" dirty="0" smtClean="0"/>
-              <a:t>Converting relational data to features for </a:t>
-            </a:r>
-            <a:r>
-              <a:rPr lang="en-US" sz="2800" dirty="0" err="1" smtClean="0"/>
-              <a:t>i.i.d</a:t>
-            </a:r>
-            <a:r>
-              <a:rPr lang="en-US" sz="2800" dirty="0" smtClean="0"/>
-              <a:t>. learning is called </a:t>
-            </a:r>
-            <a:r>
-              <a:rPr lang="en-US" sz="2800" b="1" dirty="0" err="1" smtClean="0"/>
-              <a:t>propositionalization</a:t>
-            </a:r>
-            <a:endParaRPr lang="en-US" sz="2800" dirty="0" smtClean="0"/>
-          </a:p>
-          <a:p>
-            <a:pPr lvl="1"/>
-            <a:r>
-              <a:rPr lang="en-US" dirty="0" smtClean="0"/>
-              <a:t>Another term could be relation elimination</a:t>
-            </a:r>
-          </a:p>
-          <a:p>
-            <a:pPr lvl="1"/>
-            <a:r>
-              <a:rPr lang="en-US" dirty="0"/>
-              <a:t>A form of Extract, </a:t>
-            </a:r>
-            <a:r>
-              <a:rPr lang="en-US" dirty="0" smtClean="0"/>
-              <a:t>Transform, Load</a:t>
-            </a:r>
-          </a:p>
-          <a:p>
-            <a:r>
-              <a:rPr lang="en-US" sz="2800" dirty="0" smtClean="0"/>
-              <a:t>Features in a pseudo </a:t>
-            </a:r>
-            <a:r>
-              <a:rPr lang="en-US" sz="2800" dirty="0" err="1" smtClean="0"/>
-              <a:t>i.i.d</a:t>
-            </a:r>
-            <a:r>
-              <a:rPr lang="en-US" sz="2800" dirty="0" smtClean="0"/>
-              <a:t>. data view are often computed using aggregate functions (e.g. average, mode)</a:t>
-            </a:r>
-          </a:p>
-          <a:p>
-            <a:r>
-              <a:rPr lang="en-US" sz="2800" dirty="0" smtClean="0"/>
-              <a:t>See anomaly supplement for movie world example</a:t>
-            </a:r>
-          </a:p>
-          <a:p>
-            <a:endParaRPr lang="en-US" sz="2800" dirty="0"/>
+            <a:endParaRPr lang="en-US"/>
           </a:p>
         </p:txBody>
       </p:sp>
@@ -27450,94 +26852,26 @@
             <p:ph type="ftr" sz="quarter" idx="11"/>
           </p:nvPr>
         </p:nvSpPr>
-        <p:spPr>
-          <a:xfrm>
-            <a:off x="391943" y="5911325"/>
-            <a:ext cx="8105354" cy="658557"/>
-          </a:xfrm>
-        </p:spPr>
+        <p:spPr/>
         <p:txBody>
           <a:bodyPr/>
           <a:lstStyle/>
           <a:p>
-            <a:r>
-              <a:rPr lang="en-US" dirty="0"/>
-              <a:t>Lippi, M.; Jaeger, M.; </a:t>
-            </a:r>
-            <a:r>
-              <a:rPr lang="en-US" dirty="0" err="1"/>
-              <a:t>Frasconi</a:t>
-            </a:r>
-            <a:r>
-              <a:rPr lang="en-US" dirty="0"/>
-              <a:t>, P. &amp; </a:t>
-            </a:r>
-            <a:r>
-              <a:rPr lang="en-US" dirty="0" err="1"/>
-              <a:t>Passerini</a:t>
-            </a:r>
-            <a:r>
-              <a:rPr lang="en-US" dirty="0"/>
-              <a:t>, A. (2011), 'Relational information gain', </a:t>
-            </a:r>
-            <a:r>
-              <a:rPr lang="en-US" i="1" dirty="0"/>
-              <a:t>Machine Learning </a:t>
-            </a:r>
-            <a:r>
-              <a:rPr lang="en-US" b="1" i="1" dirty="0"/>
-              <a:t>83(2), 219--239</a:t>
-            </a:r>
-            <a:r>
-              <a:rPr lang="en-US" b="1" i="1" dirty="0" smtClean="0"/>
-              <a:t>.</a:t>
-            </a:r>
-          </a:p>
-          <a:p>
-            <a:r>
-              <a:rPr lang="en-US" dirty="0" err="1"/>
-              <a:t>Lavrac</a:t>
-            </a:r>
-            <a:r>
-              <a:rPr lang="en-US" dirty="0"/>
-              <a:t>, N.; </a:t>
-            </a:r>
-            <a:r>
-              <a:rPr lang="en-US" dirty="0" err="1"/>
-              <a:t>Perovsek</a:t>
-            </a:r>
-            <a:r>
-              <a:rPr lang="en-US" dirty="0"/>
-              <a:t>, M. &amp; </a:t>
-            </a:r>
-            <a:r>
-              <a:rPr lang="en-US" dirty="0" err="1"/>
-              <a:t>Vavpetic</a:t>
-            </a:r>
-            <a:r>
-              <a:rPr lang="en-US" dirty="0"/>
-              <a:t>, A. (2014), Propositionalization </a:t>
-            </a:r>
-            <a:r>
-              <a:rPr lang="en-US" dirty="0" err="1"/>
-              <a:t>Online'ECML</a:t>
-            </a:r>
-            <a:r>
-              <a:rPr lang="en-US" dirty="0"/>
-              <a:t>', Springer, , pp. </a:t>
-            </a:r>
+            <a:pPr>
+              <a:defRPr/>
+            </a:pPr>
             <a:r>
               <a:rPr lang="en-US" dirty="0" smtClean="0"/>
-              <a:t>456—459.</a:t>
-            </a:r>
-            <a:endParaRPr lang="en-US" b="1" i="1" dirty="0"/>
+              <a:t>Learning Bayesian Networks for Complex Relational Data</a:t>
+            </a:r>
+            <a:endParaRPr lang="en-US" dirty="0"/>
           </a:p>
         </p:txBody>
       </p:sp>
     </p:spTree>
     <p:extLst>
       <p:ext uri="{BB962C8B-B14F-4D97-AF65-F5344CB8AC3E}">
-        <p14:creationId xmlns:p14="http://schemas.microsoft.com/office/powerpoint/2010/main" val="3360765377"/>
+        <p14:creationId xmlns:p14="http://schemas.microsoft.com/office/powerpoint/2010/main" val="1000665056"/>
       </p:ext>
     </p:extLst>
   </p:cSld>
@@ -27547,7 +26881,7 @@
   <p:timing>
     <p:tnLst>
       <p:par>
-        <p:cTn id="1" dur="indefinite" restart="never" nodeType="tmRoot"/>
+        <p:cTn xmlns:p14="http://schemas.microsoft.com/office/powerpoint/2010/main" id="1" dur="indefinite" restart="never" nodeType="tmRoot"/>
       </p:par>
     </p:tnLst>
   </p:timing>
@@ -27573,111 +26907,6 @@
       </p:grpSpPr>
       <p:sp>
         <p:nvSpPr>
-          <p:cNvPr id="5" name="Title 4"/>
-          <p:cNvSpPr>
-            <a:spLocks noGrp="1"/>
-          </p:cNvSpPr>
-          <p:nvPr>
-            <p:ph type="title"/>
-          </p:nvPr>
-        </p:nvSpPr>
-        <p:spPr/>
-        <p:txBody>
-          <a:bodyPr/>
-          <a:lstStyle/>
-          <a:p>
-            <a:r>
-              <a:rPr lang="en-US" dirty="0" smtClean="0"/>
-              <a:t>Dependency Networks</a:t>
-            </a:r>
-            <a:endParaRPr lang="en-US" dirty="0"/>
-          </a:p>
-        </p:txBody>
-      </p:sp>
-      <p:sp>
-        <p:nvSpPr>
-          <p:cNvPr id="6" name="Text Placeholder 5"/>
-          <p:cNvSpPr>
-            <a:spLocks noGrp="1"/>
-          </p:cNvSpPr>
-          <p:nvPr>
-            <p:ph type="body" idx="1"/>
-          </p:nvPr>
-        </p:nvSpPr>
-        <p:spPr/>
-        <p:txBody>
-          <a:bodyPr/>
-          <a:lstStyle/>
-          <a:p>
-            <a:endParaRPr lang="en-US"/>
-          </a:p>
-        </p:txBody>
-      </p:sp>
-      <p:sp>
-        <p:nvSpPr>
-          <p:cNvPr id="4" name="Footer Placeholder 3"/>
-          <p:cNvSpPr>
-            <a:spLocks noGrp="1"/>
-          </p:cNvSpPr>
-          <p:nvPr>
-            <p:ph type="ftr" sz="quarter" idx="11"/>
-          </p:nvPr>
-        </p:nvSpPr>
-        <p:spPr/>
-        <p:txBody>
-          <a:bodyPr/>
-          <a:lstStyle/>
-          <a:p>
-            <a:pPr>
-              <a:defRPr/>
-            </a:pPr>
-            <a:r>
-              <a:rPr lang="en-US" dirty="0" smtClean="0"/>
-              <a:t>Learning Bayesian Networks for Complex Relational Data</a:t>
-            </a:r>
-            <a:endParaRPr lang="en-US" dirty="0"/>
-          </a:p>
-        </p:txBody>
-      </p:sp>
-    </p:spTree>
-    <p:extLst>
-      <p:ext uri="{BB962C8B-B14F-4D97-AF65-F5344CB8AC3E}">
-        <p14:creationId xmlns:p14="http://schemas.microsoft.com/office/powerpoint/2010/main" val="1000665056"/>
-      </p:ext>
-    </p:extLst>
-  </p:cSld>
-  <p:clrMapOvr>
-    <a:masterClrMapping/>
-  </p:clrMapOvr>
-  <p:timing>
-    <p:tnLst>
-      <p:par>
-        <p:cTn id="1" dur="indefinite" restart="never" nodeType="tmRoot"/>
-      </p:par>
-    </p:tnLst>
-  </p:timing>
-</p:sld>
-</file>
-
-<file path=ppt/slides/slide43.xml><?xml version="1.0" encoding="utf-8"?>
-<p:sld xmlns:a="http://schemas.openxmlformats.org/drawingml/2006/main" xmlns:r="http://schemas.openxmlformats.org/officeDocument/2006/relationships" xmlns:p="http://schemas.openxmlformats.org/presentationml/2006/main">
-  <p:cSld>
-    <p:spTree>
-      <p:nvGrpSpPr>
-        <p:cNvPr id="1" name=""/>
-        <p:cNvGrpSpPr/>
-        <p:nvPr/>
-      </p:nvGrpSpPr>
-      <p:grpSpPr>
-        <a:xfrm>
-          <a:off x="0" y="0"/>
-          <a:ext cx="0" cy="0"/>
-          <a:chOff x="0" y="0"/>
-          <a:chExt cx="0" cy="0"/>
-        </a:xfrm>
-      </p:grpSpPr>
-      <p:sp>
-        <p:nvSpPr>
           <p:cNvPr id="2" name="Title 1"/>
           <p:cNvSpPr>
             <a:spLocks noGrp="1"/>
@@ -27933,14 +27162,14 @@
   <p:timing>
     <p:tnLst>
       <p:par>
-        <p:cTn id="1" dur="indefinite" restart="never" nodeType="tmRoot"/>
+        <p:cTn xmlns:p14="http://schemas.microsoft.com/office/powerpoint/2010/main" id="1" dur="indefinite" restart="never" nodeType="tmRoot"/>
       </p:par>
     </p:tnLst>
   </p:timing>
 </p:sld>
 </file>
 
-<file path=ppt/slides/slide44.xml><?xml version="1.0" encoding="utf-8"?>
+<file path=ppt/slides/slide43.xml><?xml version="1.0" encoding="utf-8"?>
 <p:sld xmlns:a="http://schemas.openxmlformats.org/drawingml/2006/main" xmlns:r="http://schemas.openxmlformats.org/officeDocument/2006/relationships" xmlns:p="http://schemas.openxmlformats.org/presentationml/2006/main">
   <p:cSld>
     <p:spTree>
@@ -28223,14 +27452,14 @@
   <p:timing>
     <p:tnLst>
       <p:par>
-        <p:cTn id="1" dur="indefinite" restart="never" nodeType="tmRoot"/>
+        <p:cTn xmlns:p14="http://schemas.microsoft.com/office/powerpoint/2010/main" id="1" dur="indefinite" restart="never" nodeType="tmRoot"/>
       </p:par>
     </p:tnLst>
   </p:timing>
 </p:sld>
 </file>
 
-<file path=ppt/slides/slide45.xml><?xml version="1.0" encoding="utf-8"?>
+<file path=ppt/slides/slide44.xml><?xml version="1.0" encoding="utf-8"?>
 <p:sld xmlns:a="http://schemas.openxmlformats.org/drawingml/2006/main" xmlns:r="http://schemas.openxmlformats.org/officeDocument/2006/relationships" xmlns:p="http://schemas.openxmlformats.org/presentationml/2006/main">
   <p:cSld>
     <p:spTree>
@@ -29598,14 +28827,14 @@
   <p:timing>
     <p:tnLst>
       <p:par>
-        <p:cTn id="1" dur="indefinite" restart="never" nodeType="tmRoot"/>
+        <p:cTn xmlns:p14="http://schemas.microsoft.com/office/powerpoint/2010/main" id="1" dur="indefinite" restart="never" nodeType="tmRoot"/>
       </p:par>
     </p:tnLst>
   </p:timing>
 </p:sld>
 </file>
 
-<file path=ppt/slides/slide46.xml><?xml version="1.0" encoding="utf-8"?>
+<file path=ppt/slides/slide45.xml><?xml version="1.0" encoding="utf-8"?>
 <p:sld xmlns:a="http://schemas.openxmlformats.org/drawingml/2006/main" xmlns:r="http://schemas.openxmlformats.org/officeDocument/2006/relationships" xmlns:p="http://schemas.openxmlformats.org/presentationml/2006/main">
   <p:cSld>
     <p:spTree>
@@ -30619,14 +29848,14 @@
   <p:timing>
     <p:tnLst>
       <p:par>
-        <p:cTn id="1" dur="indefinite" restart="never" nodeType="tmRoot"/>
+        <p:cTn xmlns:p14="http://schemas.microsoft.com/office/powerpoint/2010/main" id="1" dur="indefinite" restart="never" nodeType="tmRoot"/>
       </p:par>
     </p:tnLst>
   </p:timing>
 </p:sld>
 </file>
 
-<file path=ppt/slides/slide47.xml><?xml version="1.0" encoding="utf-8"?>
+<file path=ppt/slides/slide46.xml><?xml version="1.0" encoding="utf-8"?>
 <p:sld xmlns:a="http://schemas.openxmlformats.org/drawingml/2006/main" xmlns:r="http://schemas.openxmlformats.org/officeDocument/2006/relationships" xmlns:p="http://schemas.openxmlformats.org/presentationml/2006/main">
   <p:cSld>
     <p:spTree>
@@ -30896,7 +30125,7 @@
   <p:timing>
     <p:tnLst>
       <p:par>
-        <p:cTn id="1" dur="indefinite" restart="never" nodeType="tmRoot"/>
+        <p:cTn xmlns:p14="http://schemas.microsoft.com/office/powerpoint/2010/main" id="1" dur="indefinite" restart="never" nodeType="tmRoot"/>
       </p:par>
     </p:tnLst>
   </p:timing>
@@ -31396,7 +30625,7 @@
   <p:timing>
     <p:tnLst>
       <p:par>
-        <p:cTn id="1" dur="indefinite" restart="never" nodeType="tmRoot">
+        <p:cTn xmlns:p14="http://schemas.microsoft.com/office/powerpoint/2010/main" id="1" dur="indefinite" restart="never" nodeType="tmRoot">
           <p:childTnLst>
             <p:seq concurrent="1" nextAc="seek">
               <p:cTn id="2" dur="indefinite" nodeType="mainSeq">
@@ -31665,7 +30894,7 @@
   <p:timing>
     <p:tnLst>
       <p:par>
-        <p:cTn id="1" dur="indefinite" restart="never" nodeType="tmRoot"/>
+        <p:cTn xmlns:p14="http://schemas.microsoft.com/office/powerpoint/2010/main" id="1" dur="indefinite" restart="never" nodeType="tmRoot"/>
       </p:par>
     </p:tnLst>
   </p:timing>
@@ -32642,7 +31871,7 @@
   <p:timing>
     <p:tnLst>
       <p:par>
-        <p:cTn id="1" dur="indefinite" restart="never" nodeType="tmRoot"/>
+        <p:cTn xmlns:p14="http://schemas.microsoft.com/office/powerpoint/2010/main" id="1" dur="indefinite" restart="never" nodeType="tmRoot"/>
       </p:par>
     </p:tnLst>
   </p:timing>
@@ -33168,7 +32397,7 @@
   <p:timing>
     <p:tnLst>
       <p:par>
-        <p:cTn id="1" dur="indefinite" restart="never" nodeType="tmRoot"/>
+        <p:cTn xmlns:p14="http://schemas.microsoft.com/office/powerpoint/2010/main" id="1" dur="indefinite" restart="never" nodeType="tmRoot"/>
       </p:par>
     </p:tnLst>
   </p:timing>
@@ -33689,18 +32918,15 @@
             <a:noFill/>
           </a:ln>
           <a:extLst>
-            <a:ext uri="{FAA26D3D-D897-4be2-8F04-BA451C77F1D7}">
-              <ma14:placeholderFlag xmlns:ma14="http://schemas.microsoft.com/office/mac/drawingml/2011/main" val="1"/>
-            </a:ext>
             <a:ext uri="{909E8E84-426E-40dd-AFC4-6F175D3DCCD1}">
-              <a14:hiddenFill xmlns:a14="http://schemas.microsoft.com/office/drawing/2010/main" xmlns="">
+              <a14:hiddenFill xmlns:a14="http://schemas.microsoft.com/office/drawing/2010/main">
                 <a:solidFill>
                   <a:srgbClr val="FFFFFF"/>
                 </a:solidFill>
               </a14:hiddenFill>
             </a:ext>
             <a:ext uri="{91240B29-F687-4f45-9708-019B960494DF}">
-              <a14:hiddenLine xmlns:a14="http://schemas.microsoft.com/office/drawing/2010/main" xmlns="" w="9525">
+              <a14:hiddenLine xmlns:a14="http://schemas.microsoft.com/office/drawing/2010/main" w="9525">
                 <a:solidFill>
                   <a:srgbClr val="000000"/>
                 </a:solidFill>
@@ -33708,6 +32934,9 @@
                 <a:headEnd/>
                 <a:tailEnd/>
               </a14:hiddenLine>
+            </a:ext>
+            <a:ext uri="{FAA26D3D-D897-4be2-8F04-BA451C77F1D7}">
+              <ma14:placeholderFlag xmlns:ma14="http://schemas.microsoft.com/office/mac/drawingml/2011/main" val="1"/>
             </a:ext>
           </a:extLst>
         </p:spPr>
@@ -33935,7 +33164,7 @@
   <p:timing>
     <p:tnLst>
       <p:par>
-        <p:cTn id="1" dur="indefinite" restart="never" nodeType="tmRoot"/>
+        <p:cTn xmlns:p14="http://schemas.microsoft.com/office/powerpoint/2010/main" id="1" dur="indefinite" restart="never" nodeType="tmRoot"/>
       </p:par>
     </p:tnLst>
   </p:timing>

</xml_diff>